<commit_message>
done with the general stuff about functional programming
</commit_message>
<xml_diff>
--- a/MSDays09_HristoDeshev.pptx
+++ b/MSDays09_HristoDeshev.pptx
@@ -5,12 +5,16 @@
     <p:sldMasterId id="2147483648" r:id="rId1"/>
   </p:sldMasterIdLst>
   <p:notesMasterIdLst>
-    <p:notesMasterId r:id="rId5"/>
+    <p:notesMasterId r:id="rId9"/>
   </p:notesMasterIdLst>
   <p:sldIdLst>
     <p:sldId id="256" r:id="rId2"/>
     <p:sldId id="257" r:id="rId3"/>
     <p:sldId id="258" r:id="rId4"/>
+    <p:sldId id="259" r:id="rId5"/>
+    <p:sldId id="261" r:id="rId6"/>
+    <p:sldId id="260" r:id="rId7"/>
+    <p:sldId id="262" r:id="rId8"/>
   </p:sldIdLst>
   <p:sldSz cx="9144000" cy="6858000" type="screen4x3"/>
   <p:notesSz cx="6858000" cy="9144000"/>
@@ -195,7 +199,7 @@
             <a:fld id="{E9B90EA8-0933-4830-B8D7-AF106ED53158}" type="datetimeFigureOut">
               <a:rPr lang="en-US" smtClean="0"/>
               <a:pPr/>
-              <a:t>4/12/2009</a:t>
+              <a:t>4/13/2009</a:t>
             </a:fld>
             <a:endParaRPr lang="en-US"/>
           </a:p>
@@ -535,7 +539,7 @@
             <a:fld id="{B1E722B2-FF8C-4E07-8F66-B68AE76DF7F3}" type="datetime4">
               <a:rPr lang="bg-BG" smtClean="0"/>
               <a:pPr/>
-              <a:t>12 април 2009 г.</a:t>
+              <a:t>13 април 2009 г.</a:t>
             </a:fld>
             <a:endParaRPr lang="en-US"/>
           </a:p>
@@ -918,7 +922,7 @@
             <a:fld id="{B0BB7772-550A-4FE5-83AA-31D5ECE54342}" type="datetime4">
               <a:rPr lang="bg-BG" smtClean="0"/>
               <a:pPr/>
-              <a:t>12 април 2009 г.</a:t>
+              <a:t>13 април 2009 г.</a:t>
             </a:fld>
             <a:endParaRPr lang="en-US"/>
           </a:p>
@@ -1289,7 +1293,7 @@
             <a:fld id="{C4CF66DF-71B1-497A-9CF6-B146A9E3F7FE}" type="datetime4">
               <a:rPr lang="bg-BG" smtClean="0"/>
               <a:pPr/>
-              <a:t>12 април 2009 г.</a:t>
+              <a:t>13 април 2009 г.</a:t>
             </a:fld>
             <a:endParaRPr lang="en-US"/>
           </a:p>
@@ -1711,7 +1715,7 @@
             <a:fld id="{4DBE1F54-EC49-4292-B678-A17F961BB737}" type="datetime4">
               <a:rPr lang="bg-BG" smtClean="0"/>
               <a:pPr/>
-              <a:t>12 април 2009 г.</a:t>
+              <a:t>13 април 2009 г.</a:t>
             </a:fld>
             <a:endParaRPr lang="en-US"/>
           </a:p>
@@ -2183,7 +2187,7 @@
             <a:fld id="{C8CDDBCB-7A68-44AB-B22D-E6A87E33AA73}" type="datetime4">
               <a:rPr lang="bg-BG" smtClean="0"/>
               <a:pPr/>
-              <a:t>12 април 2009 г.</a:t>
+              <a:t>13 април 2009 г.</a:t>
             </a:fld>
             <a:endParaRPr lang="en-US"/>
           </a:p>
@@ -2634,7 +2638,7 @@
             <a:fld id="{30F1E36E-C33D-4D17-9CF1-A80564111F40}" type="datetime4">
               <a:rPr lang="bg-BG" smtClean="0"/>
               <a:pPr/>
-              <a:t>12 април 2009 г.</a:t>
+              <a:t>13 април 2009 г.</a:t>
             </a:fld>
             <a:endParaRPr lang="en-US"/>
           </a:p>
@@ -3248,7 +3252,7 @@
             <a:fld id="{EE1E4F47-7C80-4EFC-8FCB-C718C12F32D4}" type="datetime4">
               <a:rPr lang="bg-BG" smtClean="0"/>
               <a:pPr/>
-              <a:t>12 април 2009 г.</a:t>
+              <a:t>13 април 2009 г.</a:t>
             </a:fld>
             <a:endParaRPr lang="en-US"/>
           </a:p>
@@ -3562,7 +3566,7 @@
             <a:fld id="{6A5E1B13-3A6D-4B8E-AF03-819C9B0CEB52}" type="datetime4">
               <a:rPr lang="bg-BG" smtClean="0"/>
               <a:pPr/>
-              <a:t>12 април 2009 г.</a:t>
+              <a:t>13 април 2009 г.</a:t>
             </a:fld>
             <a:endParaRPr lang="en-US"/>
           </a:p>
@@ -3876,7 +3880,7 @@
             <a:fld id="{A754F394-29D4-487E-9FEA-4187CE7DFCCB}" type="datetime4">
               <a:rPr lang="bg-BG" smtClean="0"/>
               <a:pPr/>
-              <a:t>12 април 2009 г.</a:t>
+              <a:t>13 април 2009 г.</a:t>
             </a:fld>
             <a:endParaRPr lang="en-US"/>
           </a:p>
@@ -4342,7 +4346,7 @@
             <a:fld id="{C2CB05D6-916D-49CB-931D-17709F1C58DB}" type="datetime4">
               <a:rPr lang="bg-BG" smtClean="0"/>
               <a:pPr/>
-              <a:t>12 април 2009 г.</a:t>
+              <a:t>13 април 2009 г.</a:t>
             </a:fld>
             <a:endParaRPr lang="en-US"/>
           </a:p>
@@ -4784,7 +4788,7 @@
             <a:fld id="{B812156F-4489-47C0-BF90-2A1A0F8AB9F1}" type="datetime4">
               <a:rPr lang="bg-BG" smtClean="0"/>
               <a:pPr/>
-              <a:t>12 април 2009 г.</a:t>
+              <a:t>13 април 2009 г.</a:t>
             </a:fld>
             <a:endParaRPr lang="en-US"/>
           </a:p>
@@ -5148,7 +5152,7 @@
             <a:fld id="{A732CE53-D585-4572-A7E1-6BFB4A413506}" type="datetime4">
               <a:rPr lang="bg-BG" smtClean="0"/>
               <a:pPr/>
-              <a:t>12 април 2009 г.</a:t>
+              <a:t>13 април 2009 г.</a:t>
             </a:fld>
             <a:endParaRPr lang="en-US"/>
           </a:p>
@@ -5734,6 +5738,13 @@
   <p:clrMapOvr>
     <a:masterClrMapping/>
   </p:clrMapOvr>
+  <p:timing>
+    <p:tnLst>
+      <p:par>
+        <p:cTn id="1" dur="indefinite" restart="never" nodeType="tmRoot"/>
+      </p:par>
+    </p:tnLst>
+  </p:timing>
 </p:sld>
 </file>
 
@@ -5772,7 +5783,7 @@
             <a:fld id="{A754F394-29D4-487E-9FEA-4187CE7DFCCB}" type="datetime4">
               <a:rPr lang="bg-BG" smtClean="0"/>
               <a:pPr/>
-              <a:t>12 април 2009 г.</a:t>
+              <a:t>13 април 2009 г.</a:t>
             </a:fld>
             <a:endParaRPr lang="en-US"/>
           </a:p>
@@ -5891,6 +5902,13 @@
   <p:clrMapOvr>
     <a:masterClrMapping/>
   </p:clrMapOvr>
+  <p:timing>
+    <p:tnLst>
+      <p:par>
+        <p:cTn id="1" dur="indefinite" restart="never" nodeType="tmRoot"/>
+      </p:par>
+    </p:tnLst>
+  </p:timing>
 </p:sld>
 </file>
 
@@ -5926,7 +5944,34 @@
           <a:bodyPr/>
           <a:lstStyle/>
           <a:p>
-            <a:endParaRPr lang="en-US" dirty="0"/>
+            <a:r>
+              <a:rPr lang="bg-BG" dirty="0" smtClean="0"/>
+              <a:t>Функционален</a:t>
+            </a:r>
+            <a:endParaRPr lang="bg-BG" dirty="0"/>
+          </a:p>
+          <a:p>
+            <a:r>
+              <a:rPr lang="bg-BG" dirty="0" smtClean="0"/>
+              <a:t>Разнороден</a:t>
+            </a:r>
+          </a:p>
+          <a:p>
+            <a:r>
+              <a:rPr lang="bg-BG" dirty="0" smtClean="0"/>
+              <a:t>Стъпил върху .</a:t>
+            </a:r>
+            <a:r>
+              <a:rPr lang="en-US" dirty="0" smtClean="0"/>
+              <a:t>NET</a:t>
+            </a:r>
+          </a:p>
+          <a:p>
+            <a:r>
+              <a:rPr lang="bg-BG" dirty="0" smtClean="0"/>
+              <a:t>Прагматичен</a:t>
+            </a:r>
+            <a:endParaRPr lang="bg-BG" dirty="0" smtClean="0"/>
           </a:p>
         </p:txBody>
       </p:sp>
@@ -5948,7 +5993,7 @@
             <a:fld id="{A754F394-29D4-487E-9FEA-4187CE7DFCCB}" type="datetime4">
               <a:rPr lang="bg-BG" smtClean="0"/>
               <a:pPr/>
-              <a:t>12 април 2009 г.</a:t>
+              <a:t>13 април 2009 г.</a:t>
             </a:fld>
             <a:endParaRPr lang="en-US"/>
           </a:p>
@@ -5993,6 +6038,1259 @@
           <a:bodyPr/>
           <a:lstStyle/>
           <a:p>
+            <a:r>
+              <a:rPr lang="bg-BG" dirty="0" smtClean="0"/>
+              <a:t>Какъв език е </a:t>
+            </a:r>
+            <a:r>
+              <a:rPr lang="en-US" dirty="0" smtClean="0"/>
+              <a:t>F#</a:t>
+            </a:r>
+            <a:r>
+              <a:rPr lang="bg-BG" dirty="0" smtClean="0"/>
+              <a:t>?</a:t>
+            </a:r>
+            <a:endParaRPr lang="en-US" dirty="0"/>
+          </a:p>
+        </p:txBody>
+      </p:sp>
+    </p:spTree>
+  </p:cSld>
+  <p:clrMapOvr>
+    <a:masterClrMapping/>
+  </p:clrMapOvr>
+  <p:timing>
+    <p:tnLst>
+      <p:par>
+        <p:cTn id="1" dur="indefinite" restart="never" nodeType="tmRoot">
+          <p:childTnLst>
+            <p:seq concurrent="1" nextAc="seek">
+              <p:cTn id="2" dur="indefinite" nodeType="mainSeq">
+                <p:childTnLst>
+                  <p:par>
+                    <p:cTn id="3" fill="hold">
+                      <p:stCondLst>
+                        <p:cond delay="indefinite"/>
+                      </p:stCondLst>
+                      <p:childTnLst>
+                        <p:par>
+                          <p:cTn id="4" fill="hold">
+                            <p:stCondLst>
+                              <p:cond delay="0"/>
+                            </p:stCondLst>
+                            <p:childTnLst>
+                              <p:par>
+                                <p:cTn id="5" presetID="1" presetClass="entr" presetSubtype="0" fill="hold" nodeType="clickEffect">
+                                  <p:stCondLst>
+                                    <p:cond delay="0"/>
+                                  </p:stCondLst>
+                                  <p:childTnLst>
+                                    <p:set>
+                                      <p:cBhvr>
+                                        <p:cTn id="6" dur="1" fill="hold">
+                                          <p:stCondLst>
+                                            <p:cond delay="0"/>
+                                          </p:stCondLst>
+                                        </p:cTn>
+                                        <p:tgtEl>
+                                          <p:spTgt spid="5">
+                                            <p:txEl>
+                                              <p:pRg st="0" end="0"/>
+                                            </p:txEl>
+                                          </p:spTgt>
+                                        </p:tgtEl>
+                                        <p:attrNameLst>
+                                          <p:attrName>style.visibility</p:attrName>
+                                        </p:attrNameLst>
+                                      </p:cBhvr>
+                                      <p:to>
+                                        <p:strVal val="visible"/>
+                                      </p:to>
+                                    </p:set>
+                                  </p:childTnLst>
+                                </p:cTn>
+                              </p:par>
+                            </p:childTnLst>
+                          </p:cTn>
+                        </p:par>
+                      </p:childTnLst>
+                    </p:cTn>
+                  </p:par>
+                  <p:par>
+                    <p:cTn id="7" fill="hold">
+                      <p:stCondLst>
+                        <p:cond delay="indefinite"/>
+                      </p:stCondLst>
+                      <p:childTnLst>
+                        <p:par>
+                          <p:cTn id="8" fill="hold">
+                            <p:stCondLst>
+                              <p:cond delay="0"/>
+                            </p:stCondLst>
+                            <p:childTnLst>
+                              <p:par>
+                                <p:cTn id="9" presetID="1" presetClass="entr" presetSubtype="0" fill="hold" nodeType="clickEffect">
+                                  <p:stCondLst>
+                                    <p:cond delay="0"/>
+                                  </p:stCondLst>
+                                  <p:childTnLst>
+                                    <p:set>
+                                      <p:cBhvr>
+                                        <p:cTn id="10" dur="1" fill="hold">
+                                          <p:stCondLst>
+                                            <p:cond delay="0"/>
+                                          </p:stCondLst>
+                                        </p:cTn>
+                                        <p:tgtEl>
+                                          <p:spTgt spid="5">
+                                            <p:txEl>
+                                              <p:pRg st="1" end="1"/>
+                                            </p:txEl>
+                                          </p:spTgt>
+                                        </p:tgtEl>
+                                        <p:attrNameLst>
+                                          <p:attrName>style.visibility</p:attrName>
+                                        </p:attrNameLst>
+                                      </p:cBhvr>
+                                      <p:to>
+                                        <p:strVal val="visible"/>
+                                      </p:to>
+                                    </p:set>
+                                  </p:childTnLst>
+                                </p:cTn>
+                              </p:par>
+                            </p:childTnLst>
+                          </p:cTn>
+                        </p:par>
+                      </p:childTnLst>
+                    </p:cTn>
+                  </p:par>
+                  <p:par>
+                    <p:cTn id="11" fill="hold">
+                      <p:stCondLst>
+                        <p:cond delay="indefinite"/>
+                      </p:stCondLst>
+                      <p:childTnLst>
+                        <p:par>
+                          <p:cTn id="12" fill="hold">
+                            <p:stCondLst>
+                              <p:cond delay="0"/>
+                            </p:stCondLst>
+                            <p:childTnLst>
+                              <p:par>
+                                <p:cTn id="13" presetID="1" presetClass="entr" presetSubtype="0" fill="hold" nodeType="clickEffect">
+                                  <p:stCondLst>
+                                    <p:cond delay="0"/>
+                                  </p:stCondLst>
+                                  <p:childTnLst>
+                                    <p:set>
+                                      <p:cBhvr>
+                                        <p:cTn id="14" dur="1" fill="hold">
+                                          <p:stCondLst>
+                                            <p:cond delay="0"/>
+                                          </p:stCondLst>
+                                        </p:cTn>
+                                        <p:tgtEl>
+                                          <p:spTgt spid="5">
+                                            <p:txEl>
+                                              <p:pRg st="2" end="2"/>
+                                            </p:txEl>
+                                          </p:spTgt>
+                                        </p:tgtEl>
+                                        <p:attrNameLst>
+                                          <p:attrName>style.visibility</p:attrName>
+                                        </p:attrNameLst>
+                                      </p:cBhvr>
+                                      <p:to>
+                                        <p:strVal val="visible"/>
+                                      </p:to>
+                                    </p:set>
+                                  </p:childTnLst>
+                                </p:cTn>
+                              </p:par>
+                            </p:childTnLst>
+                          </p:cTn>
+                        </p:par>
+                      </p:childTnLst>
+                    </p:cTn>
+                  </p:par>
+                  <p:par>
+                    <p:cTn id="15" fill="hold">
+                      <p:stCondLst>
+                        <p:cond delay="indefinite"/>
+                      </p:stCondLst>
+                      <p:childTnLst>
+                        <p:par>
+                          <p:cTn id="16" fill="hold">
+                            <p:stCondLst>
+                              <p:cond delay="0"/>
+                            </p:stCondLst>
+                            <p:childTnLst>
+                              <p:par>
+                                <p:cTn id="17" presetID="1" presetClass="entr" presetSubtype="0" fill="hold" nodeType="clickEffect">
+                                  <p:stCondLst>
+                                    <p:cond delay="0"/>
+                                  </p:stCondLst>
+                                  <p:childTnLst>
+                                    <p:set>
+                                      <p:cBhvr>
+                                        <p:cTn id="18" dur="1" fill="hold">
+                                          <p:stCondLst>
+                                            <p:cond delay="0"/>
+                                          </p:stCondLst>
+                                        </p:cTn>
+                                        <p:tgtEl>
+                                          <p:spTgt spid="5">
+                                            <p:txEl>
+                                              <p:pRg st="3" end="3"/>
+                                            </p:txEl>
+                                          </p:spTgt>
+                                        </p:tgtEl>
+                                        <p:attrNameLst>
+                                          <p:attrName>style.visibility</p:attrName>
+                                        </p:attrNameLst>
+                                      </p:cBhvr>
+                                      <p:to>
+                                        <p:strVal val="visible"/>
+                                      </p:to>
+                                    </p:set>
+                                  </p:childTnLst>
+                                </p:cTn>
+                              </p:par>
+                            </p:childTnLst>
+                          </p:cTn>
+                        </p:par>
+                      </p:childTnLst>
+                    </p:cTn>
+                  </p:par>
+                </p:childTnLst>
+              </p:cTn>
+              <p:prevCondLst>
+                <p:cond evt="onPrev" delay="0">
+                  <p:tgtEl>
+                    <p:sldTgt/>
+                  </p:tgtEl>
+                </p:cond>
+              </p:prevCondLst>
+              <p:nextCondLst>
+                <p:cond evt="onNext" delay="0">
+                  <p:tgtEl>
+                    <p:sldTgt/>
+                  </p:tgtEl>
+                </p:cond>
+              </p:nextCondLst>
+            </p:seq>
+          </p:childTnLst>
+        </p:cTn>
+      </p:par>
+    </p:tnLst>
+  </p:timing>
+</p:sld>
+</file>
+
+<file path=ppt/slides/slide4.xml><?xml version="1.0" encoding="utf-8"?>
+<p:sld xmlns:a="http://schemas.openxmlformats.org/drawingml/2006/main" xmlns:r="http://schemas.openxmlformats.org/officeDocument/2006/relationships" xmlns:p="http://schemas.openxmlformats.org/presentationml/2006/main">
+  <p:cSld>
+    <p:spTree>
+      <p:nvGrpSpPr>
+        <p:cNvPr id="1" name=""/>
+        <p:cNvGrpSpPr/>
+        <p:nvPr/>
+      </p:nvGrpSpPr>
+      <p:grpSpPr>
+        <a:xfrm>
+          <a:off x="0" y="0"/>
+          <a:ext cx="0" cy="0"/>
+          <a:chOff x="0" y="0"/>
+          <a:chExt cx="0" cy="0"/>
+        </a:xfrm>
+      </p:grpSpPr>
+      <p:sp>
+        <p:nvSpPr>
+          <p:cNvPr id="2" name="Content Placeholder 1"/>
+          <p:cNvSpPr>
+            <a:spLocks noGrp="1"/>
+          </p:cNvSpPr>
+          <p:nvPr>
+            <p:ph idx="1"/>
+          </p:nvPr>
+        </p:nvSpPr>
+        <p:spPr/>
+        <p:txBody>
+          <a:bodyPr/>
+          <a:lstStyle/>
+          <a:p>
+            <a:r>
+              <a:rPr lang="bg-BG" dirty="0" smtClean="0"/>
+              <a:t>Принципите идват от </a:t>
+            </a:r>
+            <a:r>
+              <a:rPr lang="en-US" dirty="0" smtClean="0"/>
+              <a:t>LISP</a:t>
+            </a:r>
+            <a:r>
+              <a:rPr lang="bg-BG" dirty="0" smtClean="0"/>
+              <a:t> – краят на 50-те години на 20-ти век.</a:t>
+            </a:r>
+          </a:p>
+          <a:p>
+            <a:r>
+              <a:rPr lang="bg-BG" dirty="0" smtClean="0"/>
+              <a:t>Създаден от Дон Сайм (</a:t>
+            </a:r>
+            <a:r>
+              <a:rPr lang="en-US" dirty="0" smtClean="0"/>
+              <a:t>Don </a:t>
+            </a:r>
+            <a:r>
+              <a:rPr lang="en-US" dirty="0" err="1" smtClean="0"/>
+              <a:t>Syme</a:t>
+            </a:r>
+            <a:r>
+              <a:rPr lang="en-US" dirty="0" smtClean="0"/>
+              <a:t>)</a:t>
+            </a:r>
+            <a:r>
+              <a:rPr lang="bg-BG" dirty="0" smtClean="0"/>
+              <a:t> през 2002 г.</a:t>
+            </a:r>
+          </a:p>
+          <a:p>
+            <a:pPr lvl="1"/>
+            <a:r>
+              <a:rPr lang="bg-BG" dirty="0" smtClean="0"/>
+              <a:t>първоначално замислян като </a:t>
+            </a:r>
+            <a:r>
+              <a:rPr lang="en-US" dirty="0" smtClean="0"/>
+              <a:t>ML</a:t>
+            </a:r>
+            <a:r>
+              <a:rPr lang="bg-BG" dirty="0" smtClean="0"/>
+              <a:t> за .</a:t>
+            </a:r>
+            <a:r>
+              <a:rPr lang="en-US" dirty="0" smtClean="0"/>
+              <a:t>NET</a:t>
+            </a:r>
+            <a:r>
+              <a:rPr lang="bg-BG" dirty="0" smtClean="0"/>
+              <a:t>;</a:t>
+            </a:r>
+          </a:p>
+          <a:p>
+            <a:pPr lvl="1"/>
+            <a:r>
+              <a:rPr lang="bg-BG" dirty="0" smtClean="0"/>
+              <a:t>д</a:t>
+            </a:r>
+            <a:r>
+              <a:rPr lang="bg-BG" dirty="0" smtClean="0"/>
+              <a:t>о голяма степен съвместим с </a:t>
+            </a:r>
+            <a:r>
+              <a:rPr lang="en-US" dirty="0" err="1" smtClean="0"/>
+              <a:t>Ocaml</a:t>
+            </a:r>
+            <a:r>
+              <a:rPr lang="bg-BG" dirty="0" smtClean="0"/>
+              <a:t>.</a:t>
+            </a:r>
+          </a:p>
+          <a:p>
+            <a:r>
+              <a:rPr lang="bg-BG" dirty="0" smtClean="0"/>
+              <a:t>Винаги е бил много преносим</a:t>
+            </a:r>
+          </a:p>
+          <a:p>
+            <a:r>
+              <a:rPr lang="bg-BG" dirty="0" smtClean="0"/>
+              <a:t>С отворен код</a:t>
+            </a:r>
+            <a:endParaRPr lang="en-US" dirty="0"/>
+          </a:p>
+        </p:txBody>
+      </p:sp>
+      <p:sp>
+        <p:nvSpPr>
+          <p:cNvPr id="3" name="Date Placeholder 2"/>
+          <p:cNvSpPr>
+            <a:spLocks noGrp="1"/>
+          </p:cNvSpPr>
+          <p:nvPr>
+            <p:ph type="dt" sz="half" idx="10"/>
+          </p:nvPr>
+        </p:nvSpPr>
+        <p:spPr/>
+        <p:txBody>
+          <a:bodyPr/>
+          <a:lstStyle/>
+          <a:p>
+            <a:fld id="{4DBE1F54-EC49-4292-B678-A17F961BB737}" type="datetime4">
+              <a:rPr lang="bg-BG" smtClean="0"/>
+              <a:pPr/>
+              <a:t>13 април 2009 г.</a:t>
+            </a:fld>
+            <a:endParaRPr lang="en-US"/>
+          </a:p>
+        </p:txBody>
+      </p:sp>
+      <p:sp>
+        <p:nvSpPr>
+          <p:cNvPr id="4" name="Slide Number Placeholder 3"/>
+          <p:cNvSpPr>
+            <a:spLocks noGrp="1"/>
+          </p:cNvSpPr>
+          <p:nvPr>
+            <p:ph type="sldNum" sz="quarter" idx="12"/>
+          </p:nvPr>
+        </p:nvSpPr>
+        <p:spPr/>
+        <p:txBody>
+          <a:bodyPr/>
+          <a:lstStyle/>
+          <a:p>
+            <a:fld id="{E9FD1C07-6539-4B1B-9734-EADDB64D7A3F}" type="slidenum">
+              <a:rPr lang="en-US" smtClean="0"/>
+              <a:pPr/>
+              <a:t>4</a:t>
+            </a:fld>
+            <a:endParaRPr lang="en-US"/>
+          </a:p>
+        </p:txBody>
+      </p:sp>
+      <p:sp>
+        <p:nvSpPr>
+          <p:cNvPr id="5" name="Title 4"/>
+          <p:cNvSpPr>
+            <a:spLocks noGrp="1"/>
+          </p:cNvSpPr>
+          <p:nvPr>
+            <p:ph type="title"/>
+          </p:nvPr>
+        </p:nvSpPr>
+        <p:spPr/>
+        <p:txBody>
+          <a:bodyPr/>
+          <a:lstStyle/>
+          <a:p>
+            <a:r>
+              <a:rPr lang="bg-BG" dirty="0" smtClean="0"/>
+              <a:t>Историята на езика</a:t>
+            </a:r>
+            <a:endParaRPr lang="en-US" dirty="0"/>
+          </a:p>
+        </p:txBody>
+      </p:sp>
+    </p:spTree>
+  </p:cSld>
+  <p:clrMapOvr>
+    <a:masterClrMapping/>
+  </p:clrMapOvr>
+  <p:timing>
+    <p:tnLst>
+      <p:par>
+        <p:cTn id="1" dur="indefinite" restart="never" nodeType="tmRoot"/>
+      </p:par>
+    </p:tnLst>
+  </p:timing>
+</p:sld>
+</file>
+
+<file path=ppt/slides/slide5.xml><?xml version="1.0" encoding="utf-8"?>
+<p:sld xmlns:a="http://schemas.openxmlformats.org/drawingml/2006/main" xmlns:r="http://schemas.openxmlformats.org/officeDocument/2006/relationships" xmlns:p="http://schemas.openxmlformats.org/presentationml/2006/main">
+  <p:cSld>
+    <p:spTree>
+      <p:nvGrpSpPr>
+        <p:cNvPr id="1" name=""/>
+        <p:cNvGrpSpPr/>
+        <p:nvPr/>
+      </p:nvGrpSpPr>
+      <p:grpSpPr>
+        <a:xfrm>
+          <a:off x="0" y="0"/>
+          <a:ext cx="0" cy="0"/>
+          <a:chOff x="0" y="0"/>
+          <a:chExt cx="0" cy="0"/>
+        </a:xfrm>
+      </p:grpSpPr>
+      <p:sp>
+        <p:nvSpPr>
+          <p:cNvPr id="2" name="Content Placeholder 1"/>
+          <p:cNvSpPr>
+            <a:spLocks noGrp="1"/>
+          </p:cNvSpPr>
+          <p:nvPr>
+            <p:ph idx="1"/>
+          </p:nvPr>
+        </p:nvSpPr>
+        <p:spPr/>
+        <p:txBody>
+          <a:bodyPr/>
+          <a:lstStyle/>
+          <a:p>
+            <a:r>
+              <a:rPr lang="bg-BG" dirty="0" smtClean="0"/>
+              <a:t>Разработката е по-бърза</a:t>
+            </a:r>
+          </a:p>
+          <a:p>
+            <a:pPr lvl="1"/>
+            <a:r>
+              <a:rPr lang="bg-BG" dirty="0" smtClean="0"/>
+              <a:t>пишем по-малко;</a:t>
+            </a:r>
+          </a:p>
+          <a:p>
+            <a:pPr lvl="1"/>
+            <a:r>
+              <a:rPr lang="bg-BG" dirty="0" smtClean="0"/>
+              <a:t>б</a:t>
+            </a:r>
+            <a:r>
+              <a:rPr lang="bg-BG" dirty="0" smtClean="0"/>
+              <a:t>ързо сме готови с работещи прототипи;</a:t>
+            </a:r>
+          </a:p>
+          <a:p>
+            <a:pPr lvl="1"/>
+            <a:r>
+              <a:rPr lang="bg-BG" dirty="0" smtClean="0"/>
+              <a:t>можем да го използваме като скриптов език.</a:t>
+            </a:r>
+          </a:p>
+          <a:p>
+            <a:r>
+              <a:rPr lang="bg-BG" dirty="0" smtClean="0"/>
+              <a:t>Нов език всяка година</a:t>
+            </a:r>
+          </a:p>
+          <a:p>
+            <a:pPr lvl="1"/>
+            <a:r>
+              <a:rPr lang="bg-BG" dirty="0" smtClean="0"/>
+              <a:t>променя начинът ни на мислене.</a:t>
+            </a:r>
+          </a:p>
+          <a:p>
+            <a:r>
+              <a:rPr lang="bg-BG" dirty="0" smtClean="0"/>
+              <a:t>Усещаме накъде духа вятърът</a:t>
+            </a:r>
+          </a:p>
+          <a:p>
+            <a:pPr lvl="1"/>
+            <a:r>
+              <a:rPr lang="bg-BG" dirty="0" smtClean="0"/>
+              <a:t>бъдещето на </a:t>
+            </a:r>
+            <a:r>
+              <a:rPr lang="en-US" dirty="0" smtClean="0"/>
+              <a:t>C#/VB.NET?</a:t>
+            </a:r>
+            <a:endParaRPr lang="en-US" dirty="0"/>
+          </a:p>
+        </p:txBody>
+      </p:sp>
+      <p:sp>
+        <p:nvSpPr>
+          <p:cNvPr id="3" name="Date Placeholder 2"/>
+          <p:cNvSpPr>
+            <a:spLocks noGrp="1"/>
+          </p:cNvSpPr>
+          <p:nvPr>
+            <p:ph type="dt" sz="half" idx="10"/>
+          </p:nvPr>
+        </p:nvSpPr>
+        <p:spPr/>
+        <p:txBody>
+          <a:bodyPr/>
+          <a:lstStyle/>
+          <a:p>
+            <a:fld id="{4DBE1F54-EC49-4292-B678-A17F961BB737}" type="datetime4">
+              <a:rPr lang="bg-BG" smtClean="0"/>
+              <a:pPr/>
+              <a:t>13 април 2009 г.</a:t>
+            </a:fld>
+            <a:endParaRPr lang="en-US"/>
+          </a:p>
+        </p:txBody>
+      </p:sp>
+      <p:sp>
+        <p:nvSpPr>
+          <p:cNvPr id="4" name="Slide Number Placeholder 3"/>
+          <p:cNvSpPr>
+            <a:spLocks noGrp="1"/>
+          </p:cNvSpPr>
+          <p:nvPr>
+            <p:ph type="sldNum" sz="quarter" idx="12"/>
+          </p:nvPr>
+        </p:nvSpPr>
+        <p:spPr/>
+        <p:txBody>
+          <a:bodyPr/>
+          <a:lstStyle/>
+          <a:p>
+            <a:fld id="{E9FD1C07-6539-4B1B-9734-EADDB64D7A3F}" type="slidenum">
+              <a:rPr lang="en-US" smtClean="0"/>
+              <a:pPr/>
+              <a:t>5</a:t>
+            </a:fld>
+            <a:endParaRPr lang="en-US"/>
+          </a:p>
+        </p:txBody>
+      </p:sp>
+      <p:sp>
+        <p:nvSpPr>
+          <p:cNvPr id="5" name="Title 4"/>
+          <p:cNvSpPr>
+            <a:spLocks noGrp="1"/>
+          </p:cNvSpPr>
+          <p:nvPr>
+            <p:ph type="title"/>
+          </p:nvPr>
+        </p:nvSpPr>
+        <p:spPr/>
+        <p:txBody>
+          <a:bodyPr/>
+          <a:lstStyle/>
+          <a:p>
+            <a:r>
+              <a:rPr lang="bg-BG" dirty="0" smtClean="0"/>
+              <a:t>Защо да се занимаваме с</a:t>
+            </a:r>
+            <a:r>
+              <a:rPr lang="en-US" dirty="0" smtClean="0"/>
+              <a:t> F#?</a:t>
+            </a:r>
+            <a:endParaRPr lang="en-US" dirty="0"/>
+          </a:p>
+        </p:txBody>
+      </p:sp>
+    </p:spTree>
+  </p:cSld>
+  <p:clrMapOvr>
+    <a:masterClrMapping/>
+  </p:clrMapOvr>
+  <p:timing>
+    <p:tnLst>
+      <p:par>
+        <p:cTn id="1" dur="indefinite" restart="never" nodeType="tmRoot"/>
+      </p:par>
+    </p:tnLst>
+  </p:timing>
+</p:sld>
+</file>
+
+<file path=ppt/slides/slide6.xml><?xml version="1.0" encoding="utf-8"?>
+<p:sld xmlns:a="http://schemas.openxmlformats.org/drawingml/2006/main" xmlns:r="http://schemas.openxmlformats.org/officeDocument/2006/relationships" xmlns:p="http://schemas.openxmlformats.org/presentationml/2006/main">
+  <p:cSld>
+    <p:spTree>
+      <p:nvGrpSpPr>
+        <p:cNvPr id="1" name=""/>
+        <p:cNvGrpSpPr/>
+        <p:nvPr/>
+      </p:nvGrpSpPr>
+      <p:grpSpPr>
+        <a:xfrm>
+          <a:off x="0" y="0"/>
+          <a:ext cx="0" cy="0"/>
+          <a:chOff x="0" y="0"/>
+          <a:chExt cx="0" cy="0"/>
+        </a:xfrm>
+      </p:grpSpPr>
+      <p:sp>
+        <p:nvSpPr>
+          <p:cNvPr id="2" name="Content Placeholder 1"/>
+          <p:cNvSpPr>
+            <a:spLocks noGrp="1"/>
+          </p:cNvSpPr>
+          <p:nvPr>
+            <p:ph idx="1"/>
+          </p:nvPr>
+        </p:nvSpPr>
+        <p:spPr/>
+        <p:txBody>
+          <a:bodyPr/>
+          <a:lstStyle/>
+          <a:p>
+            <a:r>
+              <a:rPr lang="bg-BG" dirty="0" smtClean="0"/>
+              <a:t>Функциите са първо качество</a:t>
+            </a:r>
+          </a:p>
+          <a:p>
+            <a:pPr lvl="1"/>
+            <a:r>
+              <a:rPr lang="bg-BG" dirty="0" smtClean="0"/>
+              <a:t>програмираме декларативно: </a:t>
+            </a:r>
+          </a:p>
+          <a:p>
+            <a:pPr lvl="2"/>
+            <a:r>
+              <a:rPr lang="bg-BG" dirty="0" smtClean="0"/>
+              <a:t>казваме какво искаме да стане </a:t>
+            </a:r>
+          </a:p>
+          <a:p>
+            <a:pPr lvl="2"/>
+            <a:r>
+              <a:rPr lang="bg-BG" dirty="0" smtClean="0"/>
+              <a:t>вместо как точно да стане</a:t>
+            </a:r>
+          </a:p>
+          <a:p>
+            <a:r>
+              <a:rPr lang="bg-BG" dirty="0" smtClean="0"/>
+              <a:t>Без странични ефекти</a:t>
+            </a:r>
+          </a:p>
+          <a:p>
+            <a:pPr lvl="1"/>
+            <a:r>
+              <a:rPr lang="bg-BG" dirty="0" smtClean="0"/>
+              <a:t>еднакъв резултат при еднакви параметри;</a:t>
+            </a:r>
+          </a:p>
+          <a:p>
+            <a:pPr lvl="1"/>
+            <a:r>
+              <a:rPr lang="bg-BG" dirty="0" smtClean="0"/>
+              <a:t>без споделена “памет”.</a:t>
+            </a:r>
+          </a:p>
+          <a:p>
+            <a:endParaRPr lang="en-US" dirty="0"/>
+          </a:p>
+        </p:txBody>
+      </p:sp>
+      <p:sp>
+        <p:nvSpPr>
+          <p:cNvPr id="3" name="Date Placeholder 2"/>
+          <p:cNvSpPr>
+            <a:spLocks noGrp="1"/>
+          </p:cNvSpPr>
+          <p:nvPr>
+            <p:ph type="dt" sz="half" idx="10"/>
+          </p:nvPr>
+        </p:nvSpPr>
+        <p:spPr/>
+        <p:txBody>
+          <a:bodyPr/>
+          <a:lstStyle/>
+          <a:p>
+            <a:fld id="{4DBE1F54-EC49-4292-B678-A17F961BB737}" type="datetime4">
+              <a:rPr lang="bg-BG" smtClean="0"/>
+              <a:pPr/>
+              <a:t>13 април 2009 г.</a:t>
+            </a:fld>
+            <a:endParaRPr lang="en-US"/>
+          </a:p>
+        </p:txBody>
+      </p:sp>
+      <p:sp>
+        <p:nvSpPr>
+          <p:cNvPr id="4" name="Slide Number Placeholder 3"/>
+          <p:cNvSpPr>
+            <a:spLocks noGrp="1"/>
+          </p:cNvSpPr>
+          <p:nvPr>
+            <p:ph type="sldNum" sz="quarter" idx="12"/>
+          </p:nvPr>
+        </p:nvSpPr>
+        <p:spPr/>
+        <p:txBody>
+          <a:bodyPr/>
+          <a:lstStyle/>
+          <a:p>
+            <a:fld id="{E9FD1C07-6539-4B1B-9734-EADDB64D7A3F}" type="slidenum">
+              <a:rPr lang="en-US" smtClean="0"/>
+              <a:pPr/>
+              <a:t>6</a:t>
+            </a:fld>
+            <a:endParaRPr lang="en-US"/>
+          </a:p>
+        </p:txBody>
+      </p:sp>
+      <p:sp>
+        <p:nvSpPr>
+          <p:cNvPr id="5" name="Title 4"/>
+          <p:cNvSpPr>
+            <a:spLocks noGrp="1"/>
+          </p:cNvSpPr>
+          <p:nvPr>
+            <p:ph type="title"/>
+          </p:nvPr>
+        </p:nvSpPr>
+        <p:spPr/>
+        <p:txBody>
+          <a:bodyPr/>
+          <a:lstStyle/>
+          <a:p>
+            <a:r>
+              <a:rPr lang="bg-BG" dirty="0" smtClean="0"/>
+              <a:t>Функционалното програмиране</a:t>
+            </a:r>
+            <a:endParaRPr lang="en-US" dirty="0"/>
+          </a:p>
+        </p:txBody>
+      </p:sp>
+    </p:spTree>
+  </p:cSld>
+  <p:clrMapOvr>
+    <a:masterClrMapping/>
+  </p:clrMapOvr>
+  <p:timing>
+    <p:tnLst>
+      <p:par>
+        <p:cTn id="1" dur="indefinite" restart="never" nodeType="tmRoot">
+          <p:childTnLst>
+            <p:seq concurrent="1" nextAc="seek">
+              <p:cTn id="2" dur="indefinite" nodeType="mainSeq">
+                <p:childTnLst>
+                  <p:par>
+                    <p:cTn id="3" fill="hold">
+                      <p:stCondLst>
+                        <p:cond delay="indefinite"/>
+                      </p:stCondLst>
+                      <p:childTnLst>
+                        <p:par>
+                          <p:cTn id="4" fill="hold">
+                            <p:stCondLst>
+                              <p:cond delay="0"/>
+                            </p:stCondLst>
+                            <p:childTnLst>
+                              <p:par>
+                                <p:cTn id="5" presetID="1" presetClass="entr" presetSubtype="0" fill="hold" nodeType="clickEffect">
+                                  <p:stCondLst>
+                                    <p:cond delay="0"/>
+                                  </p:stCondLst>
+                                  <p:childTnLst>
+                                    <p:set>
+                                      <p:cBhvr>
+                                        <p:cTn id="6" dur="1" fill="hold">
+                                          <p:stCondLst>
+                                            <p:cond delay="0"/>
+                                          </p:stCondLst>
+                                        </p:cTn>
+                                        <p:tgtEl>
+                                          <p:spTgt spid="2">
+                                            <p:txEl>
+                                              <p:pRg st="0" end="0"/>
+                                            </p:txEl>
+                                          </p:spTgt>
+                                        </p:tgtEl>
+                                        <p:attrNameLst>
+                                          <p:attrName>style.visibility</p:attrName>
+                                        </p:attrNameLst>
+                                      </p:cBhvr>
+                                      <p:to>
+                                        <p:strVal val="visible"/>
+                                      </p:to>
+                                    </p:set>
+                                  </p:childTnLst>
+                                </p:cTn>
+                              </p:par>
+                              <p:par>
+                                <p:cTn id="7" presetID="1" presetClass="entr" presetSubtype="0" fill="hold" nodeType="withEffect">
+                                  <p:stCondLst>
+                                    <p:cond delay="0"/>
+                                  </p:stCondLst>
+                                  <p:childTnLst>
+                                    <p:set>
+                                      <p:cBhvr>
+                                        <p:cTn id="8" dur="1" fill="hold">
+                                          <p:stCondLst>
+                                            <p:cond delay="0"/>
+                                          </p:stCondLst>
+                                        </p:cTn>
+                                        <p:tgtEl>
+                                          <p:spTgt spid="2">
+                                            <p:txEl>
+                                              <p:pRg st="1" end="1"/>
+                                            </p:txEl>
+                                          </p:spTgt>
+                                        </p:tgtEl>
+                                        <p:attrNameLst>
+                                          <p:attrName>style.visibility</p:attrName>
+                                        </p:attrNameLst>
+                                      </p:cBhvr>
+                                      <p:to>
+                                        <p:strVal val="visible"/>
+                                      </p:to>
+                                    </p:set>
+                                  </p:childTnLst>
+                                </p:cTn>
+                              </p:par>
+                              <p:par>
+                                <p:cTn id="9" presetID="1" presetClass="entr" presetSubtype="0" fill="hold" nodeType="withEffect">
+                                  <p:stCondLst>
+                                    <p:cond delay="0"/>
+                                  </p:stCondLst>
+                                  <p:childTnLst>
+                                    <p:set>
+                                      <p:cBhvr>
+                                        <p:cTn id="10" dur="1" fill="hold">
+                                          <p:stCondLst>
+                                            <p:cond delay="0"/>
+                                          </p:stCondLst>
+                                        </p:cTn>
+                                        <p:tgtEl>
+                                          <p:spTgt spid="2">
+                                            <p:txEl>
+                                              <p:pRg st="2" end="2"/>
+                                            </p:txEl>
+                                          </p:spTgt>
+                                        </p:tgtEl>
+                                        <p:attrNameLst>
+                                          <p:attrName>style.visibility</p:attrName>
+                                        </p:attrNameLst>
+                                      </p:cBhvr>
+                                      <p:to>
+                                        <p:strVal val="visible"/>
+                                      </p:to>
+                                    </p:set>
+                                  </p:childTnLst>
+                                </p:cTn>
+                              </p:par>
+                              <p:par>
+                                <p:cTn id="11" presetID="1" presetClass="entr" presetSubtype="0" fill="hold" nodeType="withEffect">
+                                  <p:stCondLst>
+                                    <p:cond delay="0"/>
+                                  </p:stCondLst>
+                                  <p:childTnLst>
+                                    <p:set>
+                                      <p:cBhvr>
+                                        <p:cTn id="12" dur="1" fill="hold">
+                                          <p:stCondLst>
+                                            <p:cond delay="0"/>
+                                          </p:stCondLst>
+                                        </p:cTn>
+                                        <p:tgtEl>
+                                          <p:spTgt spid="2">
+                                            <p:txEl>
+                                              <p:pRg st="3" end="3"/>
+                                            </p:txEl>
+                                          </p:spTgt>
+                                        </p:tgtEl>
+                                        <p:attrNameLst>
+                                          <p:attrName>style.visibility</p:attrName>
+                                        </p:attrNameLst>
+                                      </p:cBhvr>
+                                      <p:to>
+                                        <p:strVal val="visible"/>
+                                      </p:to>
+                                    </p:set>
+                                  </p:childTnLst>
+                                </p:cTn>
+                              </p:par>
+                            </p:childTnLst>
+                          </p:cTn>
+                        </p:par>
+                      </p:childTnLst>
+                    </p:cTn>
+                  </p:par>
+                  <p:par>
+                    <p:cTn id="13" fill="hold">
+                      <p:stCondLst>
+                        <p:cond delay="indefinite"/>
+                      </p:stCondLst>
+                      <p:childTnLst>
+                        <p:par>
+                          <p:cTn id="14" fill="hold">
+                            <p:stCondLst>
+                              <p:cond delay="0"/>
+                            </p:stCondLst>
+                            <p:childTnLst>
+                              <p:par>
+                                <p:cTn id="15" presetID="1" presetClass="entr" presetSubtype="0" fill="hold" nodeType="clickEffect">
+                                  <p:stCondLst>
+                                    <p:cond delay="0"/>
+                                  </p:stCondLst>
+                                  <p:childTnLst>
+                                    <p:set>
+                                      <p:cBhvr>
+                                        <p:cTn id="16" dur="1" fill="hold">
+                                          <p:stCondLst>
+                                            <p:cond delay="0"/>
+                                          </p:stCondLst>
+                                        </p:cTn>
+                                        <p:tgtEl>
+                                          <p:spTgt spid="2">
+                                            <p:txEl>
+                                              <p:pRg st="4" end="4"/>
+                                            </p:txEl>
+                                          </p:spTgt>
+                                        </p:tgtEl>
+                                        <p:attrNameLst>
+                                          <p:attrName>style.visibility</p:attrName>
+                                        </p:attrNameLst>
+                                      </p:cBhvr>
+                                      <p:to>
+                                        <p:strVal val="visible"/>
+                                      </p:to>
+                                    </p:set>
+                                  </p:childTnLst>
+                                </p:cTn>
+                              </p:par>
+                              <p:par>
+                                <p:cTn id="17" presetID="1" presetClass="entr" presetSubtype="0" fill="hold" nodeType="withEffect">
+                                  <p:stCondLst>
+                                    <p:cond delay="0"/>
+                                  </p:stCondLst>
+                                  <p:childTnLst>
+                                    <p:set>
+                                      <p:cBhvr>
+                                        <p:cTn id="18" dur="1" fill="hold">
+                                          <p:stCondLst>
+                                            <p:cond delay="0"/>
+                                          </p:stCondLst>
+                                        </p:cTn>
+                                        <p:tgtEl>
+                                          <p:spTgt spid="2">
+                                            <p:txEl>
+                                              <p:pRg st="5" end="5"/>
+                                            </p:txEl>
+                                          </p:spTgt>
+                                        </p:tgtEl>
+                                        <p:attrNameLst>
+                                          <p:attrName>style.visibility</p:attrName>
+                                        </p:attrNameLst>
+                                      </p:cBhvr>
+                                      <p:to>
+                                        <p:strVal val="visible"/>
+                                      </p:to>
+                                    </p:set>
+                                  </p:childTnLst>
+                                </p:cTn>
+                              </p:par>
+                              <p:par>
+                                <p:cTn id="19" presetID="1" presetClass="entr" presetSubtype="0" fill="hold" nodeType="withEffect">
+                                  <p:stCondLst>
+                                    <p:cond delay="0"/>
+                                  </p:stCondLst>
+                                  <p:childTnLst>
+                                    <p:set>
+                                      <p:cBhvr>
+                                        <p:cTn id="20" dur="1" fill="hold">
+                                          <p:stCondLst>
+                                            <p:cond delay="0"/>
+                                          </p:stCondLst>
+                                        </p:cTn>
+                                        <p:tgtEl>
+                                          <p:spTgt spid="2">
+                                            <p:txEl>
+                                              <p:pRg st="6" end="6"/>
+                                            </p:txEl>
+                                          </p:spTgt>
+                                        </p:tgtEl>
+                                        <p:attrNameLst>
+                                          <p:attrName>style.visibility</p:attrName>
+                                        </p:attrNameLst>
+                                      </p:cBhvr>
+                                      <p:to>
+                                        <p:strVal val="visible"/>
+                                      </p:to>
+                                    </p:set>
+                                  </p:childTnLst>
+                                </p:cTn>
+                              </p:par>
+                            </p:childTnLst>
+                          </p:cTn>
+                        </p:par>
+                      </p:childTnLst>
+                    </p:cTn>
+                  </p:par>
+                </p:childTnLst>
+              </p:cTn>
+              <p:prevCondLst>
+                <p:cond evt="onPrev" delay="0">
+                  <p:tgtEl>
+                    <p:sldTgt/>
+                  </p:tgtEl>
+                </p:cond>
+              </p:prevCondLst>
+              <p:nextCondLst>
+                <p:cond evt="onNext" delay="0">
+                  <p:tgtEl>
+                    <p:sldTgt/>
+                  </p:tgtEl>
+                </p:cond>
+              </p:nextCondLst>
+            </p:seq>
+          </p:childTnLst>
+        </p:cTn>
+      </p:par>
+    </p:tnLst>
+  </p:timing>
+</p:sld>
+</file>
+
+<file path=ppt/slides/slide7.xml><?xml version="1.0" encoding="utf-8"?>
+<p:sld xmlns:a="http://schemas.openxmlformats.org/drawingml/2006/main" xmlns:r="http://schemas.openxmlformats.org/officeDocument/2006/relationships" xmlns:p="http://schemas.openxmlformats.org/presentationml/2006/main">
+  <p:cSld>
+    <p:spTree>
+      <p:nvGrpSpPr>
+        <p:cNvPr id="1" name=""/>
+        <p:cNvGrpSpPr/>
+        <p:nvPr/>
+      </p:nvGrpSpPr>
+      <p:grpSpPr>
+        <a:xfrm>
+          <a:off x="0" y="0"/>
+          <a:ext cx="0" cy="0"/>
+          <a:chOff x="0" y="0"/>
+          <a:chExt cx="0" cy="0"/>
+        </a:xfrm>
+      </p:grpSpPr>
+      <p:sp>
+        <p:nvSpPr>
+          <p:cNvPr id="2" name="Content Placeholder 1"/>
+          <p:cNvSpPr>
+            <a:spLocks noGrp="1"/>
+          </p:cNvSpPr>
+          <p:nvPr>
+            <p:ph idx="1"/>
+          </p:nvPr>
+        </p:nvSpPr>
+        <p:spPr/>
+        <p:txBody>
+          <a:bodyPr/>
+          <a:lstStyle/>
+          <a:p>
+            <a:r>
+              <a:rPr lang="bg-BG" dirty="0" smtClean="0"/>
+              <a:t>Мутиралите данни са източник на проблеми</a:t>
+            </a:r>
+          </a:p>
+          <a:p>
+            <a:pPr lvl="1"/>
+            <a:r>
+              <a:rPr lang="bg-BG" dirty="0" smtClean="0"/>
+              <a:t>глупави бъгове</a:t>
+            </a:r>
+          </a:p>
+          <a:p>
+            <a:pPr lvl="1"/>
+            <a:r>
+              <a:rPr lang="bg-BG" dirty="0" smtClean="0"/>
+              <a:t>дупки в сигурността</a:t>
+            </a:r>
+          </a:p>
+          <a:p>
+            <a:pPr lvl="1"/>
+            <a:r>
+              <a:rPr lang="bg-BG" dirty="0" smtClean="0"/>
+              <a:t>трудна синхронизация: </a:t>
+            </a:r>
+            <a:r>
+              <a:rPr lang="en-US" dirty="0" smtClean="0"/>
+              <a:t>deadlocks</a:t>
+            </a:r>
+            <a:r>
+              <a:rPr lang="bg-BG" dirty="0" smtClean="0"/>
+              <a:t> и т.н.</a:t>
+            </a:r>
+          </a:p>
+          <a:p>
+            <a:r>
+              <a:rPr lang="bg-BG" dirty="0" smtClean="0"/>
+              <a:t>Решението: </a:t>
+            </a:r>
+            <a:r>
+              <a:rPr lang="en-US" dirty="0" smtClean="0"/>
+              <a:t>immutable data</a:t>
+            </a:r>
+          </a:p>
+          <a:p>
+            <a:pPr lvl="1"/>
+            <a:r>
+              <a:rPr lang="bg-BG" dirty="0" smtClean="0"/>
+              <a:t>нищо не може да се променя след като е създадено</a:t>
+            </a:r>
+          </a:p>
+          <a:p>
+            <a:pPr lvl="1"/>
+            <a:r>
+              <a:rPr lang="bg-BG" smtClean="0"/>
+              <a:t>много</a:t>
+            </a:r>
+            <a:r>
+              <a:rPr lang="bg-BG" dirty="0" smtClean="0"/>
+              <a:t>, много различен стил на програмиране</a:t>
+            </a:r>
+          </a:p>
+        </p:txBody>
+      </p:sp>
+      <p:sp>
+        <p:nvSpPr>
+          <p:cNvPr id="3" name="Date Placeholder 2"/>
+          <p:cNvSpPr>
+            <a:spLocks noGrp="1"/>
+          </p:cNvSpPr>
+          <p:nvPr>
+            <p:ph type="dt" sz="half" idx="10"/>
+          </p:nvPr>
+        </p:nvSpPr>
+        <p:spPr/>
+        <p:txBody>
+          <a:bodyPr/>
+          <a:lstStyle/>
+          <a:p>
+            <a:fld id="{4DBE1F54-EC49-4292-B678-A17F961BB737}" type="datetime4">
+              <a:rPr lang="bg-BG" smtClean="0"/>
+              <a:pPr/>
+              <a:t>13 април 2009 г.</a:t>
+            </a:fld>
+            <a:endParaRPr lang="en-US"/>
+          </a:p>
+        </p:txBody>
+      </p:sp>
+      <p:sp>
+        <p:nvSpPr>
+          <p:cNvPr id="4" name="Slide Number Placeholder 3"/>
+          <p:cNvSpPr>
+            <a:spLocks noGrp="1"/>
+          </p:cNvSpPr>
+          <p:nvPr>
+            <p:ph type="sldNum" sz="quarter" idx="12"/>
+          </p:nvPr>
+        </p:nvSpPr>
+        <p:spPr/>
+        <p:txBody>
+          <a:bodyPr/>
+          <a:lstStyle/>
+          <a:p>
+            <a:fld id="{E9FD1C07-6539-4B1B-9734-EADDB64D7A3F}" type="slidenum">
+              <a:rPr lang="en-US" smtClean="0"/>
+              <a:pPr/>
+              <a:t>7</a:t>
+            </a:fld>
+            <a:endParaRPr lang="en-US"/>
+          </a:p>
+        </p:txBody>
+      </p:sp>
+      <p:sp>
+        <p:nvSpPr>
+          <p:cNvPr id="5" name="Title 4"/>
+          <p:cNvSpPr>
+            <a:spLocks noGrp="1"/>
+          </p:cNvSpPr>
+          <p:nvPr>
+            <p:ph type="title"/>
+          </p:nvPr>
+        </p:nvSpPr>
+        <p:spPr/>
+        <p:txBody>
+          <a:bodyPr/>
+          <a:lstStyle/>
+          <a:p>
+            <a:r>
+              <a:rPr lang="bg-BG" dirty="0" smtClean="0"/>
+              <a:t>Злите мутации</a:t>
+            </a:r>
             <a:endParaRPr lang="en-US" dirty="0"/>
           </a:p>
         </p:txBody>

</xml_diff>

<commit_message>
Somewhat done with slides. Added the F# primitives example as well.
</commit_message>
<xml_diff>
--- a/MSDays09_HristoDeshev.pptx
+++ b/MSDays09_HristoDeshev.pptx
@@ -5,7 +5,7 @@
     <p:sldMasterId id="2147483648" r:id="rId1"/>
   </p:sldMasterIdLst>
   <p:notesMasterIdLst>
-    <p:notesMasterId r:id="rId9"/>
+    <p:notesMasterId r:id="rId15"/>
   </p:notesMasterIdLst>
   <p:sldIdLst>
     <p:sldId id="256" r:id="rId2"/>
@@ -15,6 +15,12 @@
     <p:sldId id="261" r:id="rId6"/>
     <p:sldId id="260" r:id="rId7"/>
     <p:sldId id="262" r:id="rId8"/>
+    <p:sldId id="263" r:id="rId9"/>
+    <p:sldId id="264" r:id="rId10"/>
+    <p:sldId id="265" r:id="rId11"/>
+    <p:sldId id="266" r:id="rId12"/>
+    <p:sldId id="267" r:id="rId13"/>
+    <p:sldId id="268" r:id="rId14"/>
   </p:sldIdLst>
   <p:sldSz cx="9144000" cy="6858000" type="screen4x3"/>
   <p:notesSz cx="6858000" cy="9144000"/>
@@ -199,7 +205,7 @@
             <a:fld id="{E9B90EA8-0933-4830-B8D7-AF106ED53158}" type="datetimeFigureOut">
               <a:rPr lang="en-US" smtClean="0"/>
               <a:pPr/>
-              <a:t>4/13/2009</a:t>
+              <a:t>4/15/2009</a:t>
             </a:fld>
             <a:endParaRPr lang="en-US"/>
           </a:p>
@@ -539,7 +545,7 @@
             <a:fld id="{B1E722B2-FF8C-4E07-8F66-B68AE76DF7F3}" type="datetime4">
               <a:rPr lang="bg-BG" smtClean="0"/>
               <a:pPr/>
-              <a:t>13 април 2009 г.</a:t>
+              <a:t>15 април 2009 г.</a:t>
             </a:fld>
             <a:endParaRPr lang="en-US"/>
           </a:p>
@@ -922,7 +928,7 @@
             <a:fld id="{B0BB7772-550A-4FE5-83AA-31D5ECE54342}" type="datetime4">
               <a:rPr lang="bg-BG" smtClean="0"/>
               <a:pPr/>
-              <a:t>13 април 2009 г.</a:t>
+              <a:t>15 април 2009 г.</a:t>
             </a:fld>
             <a:endParaRPr lang="en-US"/>
           </a:p>
@@ -1293,7 +1299,7 @@
             <a:fld id="{C4CF66DF-71B1-497A-9CF6-B146A9E3F7FE}" type="datetime4">
               <a:rPr lang="bg-BG" smtClean="0"/>
               <a:pPr/>
-              <a:t>13 април 2009 г.</a:t>
+              <a:t>15 април 2009 г.</a:t>
             </a:fld>
             <a:endParaRPr lang="en-US"/>
           </a:p>
@@ -1715,7 +1721,7 @@
             <a:fld id="{4DBE1F54-EC49-4292-B678-A17F961BB737}" type="datetime4">
               <a:rPr lang="bg-BG" smtClean="0"/>
               <a:pPr/>
-              <a:t>13 април 2009 г.</a:t>
+              <a:t>15 април 2009 г.</a:t>
             </a:fld>
             <a:endParaRPr lang="en-US"/>
           </a:p>
@@ -2187,7 +2193,7 @@
             <a:fld id="{C8CDDBCB-7A68-44AB-B22D-E6A87E33AA73}" type="datetime4">
               <a:rPr lang="bg-BG" smtClean="0"/>
               <a:pPr/>
-              <a:t>13 април 2009 г.</a:t>
+              <a:t>15 април 2009 г.</a:t>
             </a:fld>
             <a:endParaRPr lang="en-US"/>
           </a:p>
@@ -2638,7 +2644,7 @@
             <a:fld id="{30F1E36E-C33D-4D17-9CF1-A80564111F40}" type="datetime4">
               <a:rPr lang="bg-BG" smtClean="0"/>
               <a:pPr/>
-              <a:t>13 април 2009 г.</a:t>
+              <a:t>15 април 2009 г.</a:t>
             </a:fld>
             <a:endParaRPr lang="en-US"/>
           </a:p>
@@ -3252,7 +3258,7 @@
             <a:fld id="{EE1E4F47-7C80-4EFC-8FCB-C718C12F32D4}" type="datetime4">
               <a:rPr lang="bg-BG" smtClean="0"/>
               <a:pPr/>
-              <a:t>13 април 2009 г.</a:t>
+              <a:t>15 април 2009 г.</a:t>
             </a:fld>
             <a:endParaRPr lang="en-US"/>
           </a:p>
@@ -3566,7 +3572,7 @@
             <a:fld id="{6A5E1B13-3A6D-4B8E-AF03-819C9B0CEB52}" type="datetime4">
               <a:rPr lang="bg-BG" smtClean="0"/>
               <a:pPr/>
-              <a:t>13 април 2009 г.</a:t>
+              <a:t>15 април 2009 г.</a:t>
             </a:fld>
             <a:endParaRPr lang="en-US"/>
           </a:p>
@@ -3880,7 +3886,7 @@
             <a:fld id="{A754F394-29D4-487E-9FEA-4187CE7DFCCB}" type="datetime4">
               <a:rPr lang="bg-BG" smtClean="0"/>
               <a:pPr/>
-              <a:t>13 април 2009 г.</a:t>
+              <a:t>15 април 2009 г.</a:t>
             </a:fld>
             <a:endParaRPr lang="en-US"/>
           </a:p>
@@ -4346,7 +4352,7 @@
             <a:fld id="{C2CB05D6-916D-49CB-931D-17709F1C58DB}" type="datetime4">
               <a:rPr lang="bg-BG" smtClean="0"/>
               <a:pPr/>
-              <a:t>13 април 2009 г.</a:t>
+              <a:t>15 април 2009 г.</a:t>
             </a:fld>
             <a:endParaRPr lang="en-US"/>
           </a:p>
@@ -4788,7 +4794,7 @@
             <a:fld id="{B812156F-4489-47C0-BF90-2A1A0F8AB9F1}" type="datetime4">
               <a:rPr lang="bg-BG" smtClean="0"/>
               <a:pPr/>
-              <a:t>13 април 2009 г.</a:t>
+              <a:t>15 април 2009 г.</a:t>
             </a:fld>
             <a:endParaRPr lang="en-US"/>
           </a:p>
@@ -5152,7 +5158,7 @@
             <a:fld id="{A732CE53-D585-4572-A7E1-6BFB4A413506}" type="datetime4">
               <a:rPr lang="bg-BG" smtClean="0"/>
               <a:pPr/>
-              <a:t>13 април 2009 г.</a:t>
+              <a:t>15 април 2009 г.</a:t>
             </a:fld>
             <a:endParaRPr lang="en-US"/>
           </a:p>
@@ -5748,6 +5754,608 @@
 </p:sld>
 </file>
 
+<file path=ppt/slides/slide10.xml><?xml version="1.0" encoding="utf-8"?>
+<p:sld xmlns:a="http://schemas.openxmlformats.org/drawingml/2006/main" xmlns:r="http://schemas.openxmlformats.org/officeDocument/2006/relationships" xmlns:p="http://schemas.openxmlformats.org/presentationml/2006/main">
+  <p:cSld>
+    <p:spTree>
+      <p:nvGrpSpPr>
+        <p:cNvPr id="1" name=""/>
+        <p:cNvGrpSpPr/>
+        <p:nvPr/>
+      </p:nvGrpSpPr>
+      <p:grpSpPr>
+        <a:xfrm>
+          <a:off x="0" y="0"/>
+          <a:ext cx="0" cy="0"/>
+          <a:chOff x="0" y="0"/>
+          <a:chExt cx="0" cy="0"/>
+        </a:xfrm>
+      </p:grpSpPr>
+      <p:sp>
+        <p:nvSpPr>
+          <p:cNvPr id="2" name="Content Placeholder 1"/>
+          <p:cNvSpPr>
+            <a:spLocks noGrp="1"/>
+          </p:cNvSpPr>
+          <p:nvPr>
+            <p:ph idx="1"/>
+          </p:nvPr>
+        </p:nvSpPr>
+        <p:spPr/>
+        <p:txBody>
+          <a:bodyPr/>
+          <a:lstStyle/>
+          <a:p>
+            <a:r>
+              <a:rPr lang="en-US" dirty="0" smtClean="0"/>
+              <a:t>Switch</a:t>
+            </a:r>
+            <a:r>
+              <a:rPr lang="bg-BG" dirty="0" smtClean="0"/>
+              <a:t> на стероиди</a:t>
+            </a:r>
+          </a:p>
+          <a:p>
+            <a:pPr lvl="1"/>
+            <a:r>
+              <a:rPr lang="bg-BG" dirty="0" smtClean="0"/>
+              <a:t>Кратки и експресивни.</a:t>
+            </a:r>
+          </a:p>
+          <a:p>
+            <a:pPr lvl="1"/>
+            <a:r>
+              <a:rPr lang="bg-BG" dirty="0" smtClean="0"/>
+              <a:t>Разширяеми.</a:t>
+            </a:r>
+          </a:p>
+        </p:txBody>
+      </p:sp>
+      <p:sp>
+        <p:nvSpPr>
+          <p:cNvPr id="3" name="Date Placeholder 2"/>
+          <p:cNvSpPr>
+            <a:spLocks noGrp="1"/>
+          </p:cNvSpPr>
+          <p:nvPr>
+            <p:ph type="dt" sz="half" idx="10"/>
+          </p:nvPr>
+        </p:nvSpPr>
+        <p:spPr/>
+        <p:txBody>
+          <a:bodyPr/>
+          <a:lstStyle/>
+          <a:p>
+            <a:fld id="{4DBE1F54-EC49-4292-B678-A17F961BB737}" type="datetime4">
+              <a:rPr lang="bg-BG" smtClean="0"/>
+              <a:pPr/>
+              <a:t>16 април 2009 г.</a:t>
+            </a:fld>
+            <a:endParaRPr lang="en-US"/>
+          </a:p>
+        </p:txBody>
+      </p:sp>
+      <p:sp>
+        <p:nvSpPr>
+          <p:cNvPr id="4" name="Slide Number Placeholder 3"/>
+          <p:cNvSpPr>
+            <a:spLocks noGrp="1"/>
+          </p:cNvSpPr>
+          <p:nvPr>
+            <p:ph type="sldNum" sz="quarter" idx="12"/>
+          </p:nvPr>
+        </p:nvSpPr>
+        <p:spPr/>
+        <p:txBody>
+          <a:bodyPr/>
+          <a:lstStyle/>
+          <a:p>
+            <a:fld id="{E9FD1C07-6539-4B1B-9734-EADDB64D7A3F}" type="slidenum">
+              <a:rPr lang="en-US" smtClean="0"/>
+              <a:pPr/>
+              <a:t>10</a:t>
+            </a:fld>
+            <a:endParaRPr lang="en-US"/>
+          </a:p>
+        </p:txBody>
+      </p:sp>
+      <p:sp>
+        <p:nvSpPr>
+          <p:cNvPr id="5" name="Title 4"/>
+          <p:cNvSpPr>
+            <a:spLocks noGrp="1"/>
+          </p:cNvSpPr>
+          <p:nvPr>
+            <p:ph type="title"/>
+          </p:nvPr>
+        </p:nvSpPr>
+        <p:spPr/>
+        <p:txBody>
+          <a:bodyPr/>
+          <a:lstStyle/>
+          <a:p>
+            <a:r>
+              <a:rPr lang="en-US" dirty="0" smtClean="0"/>
+              <a:t>Demo 3 – Pattern Matching</a:t>
+            </a:r>
+            <a:endParaRPr lang="en-US" dirty="0"/>
+          </a:p>
+        </p:txBody>
+      </p:sp>
+    </p:spTree>
+  </p:cSld>
+  <p:clrMapOvr>
+    <a:masterClrMapping/>
+  </p:clrMapOvr>
+</p:sld>
+</file>
+
+<file path=ppt/slides/slide11.xml><?xml version="1.0" encoding="utf-8"?>
+<p:sld xmlns:a="http://schemas.openxmlformats.org/drawingml/2006/main" xmlns:r="http://schemas.openxmlformats.org/officeDocument/2006/relationships" xmlns:p="http://schemas.openxmlformats.org/presentationml/2006/main">
+  <p:cSld>
+    <p:spTree>
+      <p:nvGrpSpPr>
+        <p:cNvPr id="1" name=""/>
+        <p:cNvGrpSpPr/>
+        <p:nvPr/>
+      </p:nvGrpSpPr>
+      <p:grpSpPr>
+        <a:xfrm>
+          <a:off x="0" y="0"/>
+          <a:ext cx="0" cy="0"/>
+          <a:chOff x="0" y="0"/>
+          <a:chExt cx="0" cy="0"/>
+        </a:xfrm>
+      </p:grpSpPr>
+      <p:sp>
+        <p:nvSpPr>
+          <p:cNvPr id="2" name="Content Placeholder 1"/>
+          <p:cNvSpPr>
+            <a:spLocks noGrp="1"/>
+          </p:cNvSpPr>
+          <p:nvPr>
+            <p:ph idx="1"/>
+          </p:nvPr>
+        </p:nvSpPr>
+        <p:spPr/>
+        <p:txBody>
+          <a:bodyPr/>
+          <a:lstStyle/>
+          <a:p>
+            <a:r>
+              <a:rPr lang="bg-BG" dirty="0" smtClean="0"/>
+              <a:t>Деклариране на класове</a:t>
+            </a:r>
+          </a:p>
+          <a:p>
+            <a:r>
+              <a:rPr lang="bg-BG" dirty="0" smtClean="0"/>
+              <a:t>Имплементиране на интерфейси</a:t>
+            </a:r>
+          </a:p>
+          <a:p>
+            <a:r>
+              <a:rPr lang="bg-BG" dirty="0" smtClean="0"/>
+              <a:t>Демо – </a:t>
+            </a:r>
+            <a:r>
+              <a:rPr lang="en-US" dirty="0" err="1" smtClean="0"/>
+              <a:t>WinForms</a:t>
+            </a:r>
+            <a:endParaRPr lang="en-US" dirty="0" smtClean="0"/>
+          </a:p>
+        </p:txBody>
+      </p:sp>
+      <p:sp>
+        <p:nvSpPr>
+          <p:cNvPr id="3" name="Date Placeholder 2"/>
+          <p:cNvSpPr>
+            <a:spLocks noGrp="1"/>
+          </p:cNvSpPr>
+          <p:nvPr>
+            <p:ph type="dt" sz="half" idx="10"/>
+          </p:nvPr>
+        </p:nvSpPr>
+        <p:spPr/>
+        <p:txBody>
+          <a:bodyPr/>
+          <a:lstStyle/>
+          <a:p>
+            <a:fld id="{4DBE1F54-EC49-4292-B678-A17F961BB737}" type="datetime4">
+              <a:rPr lang="bg-BG" smtClean="0"/>
+              <a:pPr/>
+              <a:t>16 април 2009 г.</a:t>
+            </a:fld>
+            <a:endParaRPr lang="en-US"/>
+          </a:p>
+        </p:txBody>
+      </p:sp>
+      <p:sp>
+        <p:nvSpPr>
+          <p:cNvPr id="4" name="Slide Number Placeholder 3"/>
+          <p:cNvSpPr>
+            <a:spLocks noGrp="1"/>
+          </p:cNvSpPr>
+          <p:nvPr>
+            <p:ph type="sldNum" sz="quarter" idx="12"/>
+          </p:nvPr>
+        </p:nvSpPr>
+        <p:spPr/>
+        <p:txBody>
+          <a:bodyPr/>
+          <a:lstStyle/>
+          <a:p>
+            <a:fld id="{E9FD1C07-6539-4B1B-9734-EADDB64D7A3F}" type="slidenum">
+              <a:rPr lang="en-US" smtClean="0"/>
+              <a:pPr/>
+              <a:t>11</a:t>
+            </a:fld>
+            <a:endParaRPr lang="en-US"/>
+          </a:p>
+        </p:txBody>
+      </p:sp>
+      <p:sp>
+        <p:nvSpPr>
+          <p:cNvPr id="5" name="Title 4"/>
+          <p:cNvSpPr>
+            <a:spLocks noGrp="1"/>
+          </p:cNvSpPr>
+          <p:nvPr>
+            <p:ph type="title"/>
+          </p:nvPr>
+        </p:nvSpPr>
+        <p:spPr/>
+        <p:txBody>
+          <a:bodyPr>
+            <a:normAutofit fontScale="90000"/>
+          </a:bodyPr>
+          <a:lstStyle/>
+          <a:p>
+            <a:r>
+              <a:rPr lang="bg-BG" dirty="0" smtClean="0"/>
+              <a:t>Обектно ориентирано </a:t>
+            </a:r>
+            <a:br>
+              <a:rPr lang="bg-BG" dirty="0" smtClean="0"/>
+            </a:br>
+            <a:r>
+              <a:rPr lang="bg-BG" dirty="0" smtClean="0"/>
+              <a:t>програмиране</a:t>
+            </a:r>
+            <a:endParaRPr lang="en-US" dirty="0"/>
+          </a:p>
+        </p:txBody>
+      </p:sp>
+    </p:spTree>
+  </p:cSld>
+  <p:clrMapOvr>
+    <a:masterClrMapping/>
+  </p:clrMapOvr>
+</p:sld>
+</file>
+
+<file path=ppt/slides/slide12.xml><?xml version="1.0" encoding="utf-8"?>
+<p:sld xmlns:a="http://schemas.openxmlformats.org/drawingml/2006/main" xmlns:r="http://schemas.openxmlformats.org/officeDocument/2006/relationships" xmlns:p="http://schemas.openxmlformats.org/presentationml/2006/main">
+  <p:cSld>
+    <p:spTree>
+      <p:nvGrpSpPr>
+        <p:cNvPr id="1" name=""/>
+        <p:cNvGrpSpPr/>
+        <p:nvPr/>
+      </p:nvGrpSpPr>
+      <p:grpSpPr>
+        <a:xfrm>
+          <a:off x="0" y="0"/>
+          <a:ext cx="0" cy="0"/>
+          <a:chOff x="0" y="0"/>
+          <a:chExt cx="0" cy="0"/>
+        </a:xfrm>
+      </p:grpSpPr>
+      <p:sp>
+        <p:nvSpPr>
+          <p:cNvPr id="2" name="Content Placeholder 1"/>
+          <p:cNvSpPr>
+            <a:spLocks noGrp="1"/>
+          </p:cNvSpPr>
+          <p:nvPr>
+            <p:ph idx="1"/>
+          </p:nvPr>
+        </p:nvSpPr>
+        <p:spPr/>
+        <p:txBody>
+          <a:bodyPr/>
+          <a:lstStyle/>
+          <a:p>
+            <a:r>
+              <a:rPr lang="bg-BG" dirty="0" smtClean="0"/>
+              <a:t>Най-добрата книга: </a:t>
+            </a:r>
+            <a:r>
+              <a:rPr lang="en-US" dirty="0" smtClean="0"/>
+              <a:t>Expert F#</a:t>
+            </a:r>
+            <a:r>
+              <a:rPr lang="bg-BG" dirty="0" smtClean="0"/>
+              <a:t> от </a:t>
+            </a:r>
+            <a:r>
+              <a:rPr lang="en-US" dirty="0" smtClean="0"/>
+              <a:t>Don </a:t>
+            </a:r>
+            <a:r>
+              <a:rPr lang="en-US" dirty="0" err="1" smtClean="0"/>
+              <a:t>Syme</a:t>
+            </a:r>
+            <a:r>
+              <a:rPr lang="en-US" dirty="0" smtClean="0"/>
+              <a:t>, Adam </a:t>
+            </a:r>
+            <a:r>
+              <a:rPr lang="en-US" dirty="0" err="1" smtClean="0"/>
+              <a:t>Granicz</a:t>
+            </a:r>
+            <a:r>
+              <a:rPr lang="en-US" dirty="0" smtClean="0"/>
+              <a:t>, Antonio </a:t>
+            </a:r>
+            <a:r>
+              <a:rPr lang="en-US" dirty="0" err="1" smtClean="0"/>
+              <a:t>Cisternino</a:t>
+            </a:r>
+            <a:endParaRPr lang="bg-BG" dirty="0" smtClean="0"/>
+          </a:p>
+          <a:p>
+            <a:r>
+              <a:rPr lang="bg-BG" dirty="0" smtClean="0"/>
+              <a:t>Много добър увод: </a:t>
+            </a:r>
+            <a:r>
+              <a:rPr lang="en-US" dirty="0" smtClean="0"/>
+              <a:t>Foundations of F# </a:t>
+            </a:r>
+            <a:r>
+              <a:rPr lang="bg-BG" dirty="0" smtClean="0"/>
+              <a:t>от </a:t>
+            </a:r>
+            <a:r>
+              <a:rPr lang="en-US" dirty="0" smtClean="0"/>
+              <a:t>Robert Pickering</a:t>
+            </a:r>
+          </a:p>
+          <a:p>
+            <a:r>
+              <a:rPr lang="bg-BG" dirty="0" smtClean="0"/>
+              <a:t>Безплатна уикикнига: </a:t>
+            </a:r>
+            <a:r>
+              <a:rPr lang="en-US" sz="2400" dirty="0" smtClean="0">
+                <a:hlinkClick r:id="rId2"/>
+              </a:rPr>
+              <a:t>http://</a:t>
+            </a:r>
+            <a:r>
+              <a:rPr lang="en-US" sz="2400" dirty="0" smtClean="0">
+                <a:hlinkClick r:id="rId2"/>
+              </a:rPr>
+              <a:t>en.wikibooks.org/wiki/F_Sharp_Programming</a:t>
+            </a:r>
+            <a:endParaRPr lang="bg-BG" sz="2400" dirty="0" smtClean="0"/>
+          </a:p>
+          <a:p>
+            <a:endParaRPr lang="en-US" dirty="0"/>
+          </a:p>
+        </p:txBody>
+      </p:sp>
+      <p:sp>
+        <p:nvSpPr>
+          <p:cNvPr id="3" name="Date Placeholder 2"/>
+          <p:cNvSpPr>
+            <a:spLocks noGrp="1"/>
+          </p:cNvSpPr>
+          <p:nvPr>
+            <p:ph type="dt" sz="half" idx="10"/>
+          </p:nvPr>
+        </p:nvSpPr>
+        <p:spPr/>
+        <p:txBody>
+          <a:bodyPr/>
+          <a:lstStyle/>
+          <a:p>
+            <a:fld id="{4DBE1F54-EC49-4292-B678-A17F961BB737}" type="datetime4">
+              <a:rPr lang="bg-BG" smtClean="0"/>
+              <a:pPr/>
+              <a:t>16 април 2009 г.</a:t>
+            </a:fld>
+            <a:endParaRPr lang="en-US"/>
+          </a:p>
+        </p:txBody>
+      </p:sp>
+      <p:sp>
+        <p:nvSpPr>
+          <p:cNvPr id="4" name="Slide Number Placeholder 3"/>
+          <p:cNvSpPr>
+            <a:spLocks noGrp="1"/>
+          </p:cNvSpPr>
+          <p:nvPr>
+            <p:ph type="sldNum" sz="quarter" idx="12"/>
+          </p:nvPr>
+        </p:nvSpPr>
+        <p:spPr/>
+        <p:txBody>
+          <a:bodyPr/>
+          <a:lstStyle/>
+          <a:p>
+            <a:fld id="{E9FD1C07-6539-4B1B-9734-EADDB64D7A3F}" type="slidenum">
+              <a:rPr lang="en-US" smtClean="0"/>
+              <a:pPr/>
+              <a:t>12</a:t>
+            </a:fld>
+            <a:endParaRPr lang="en-US"/>
+          </a:p>
+        </p:txBody>
+      </p:sp>
+      <p:sp>
+        <p:nvSpPr>
+          <p:cNvPr id="5" name="Title 4"/>
+          <p:cNvSpPr>
+            <a:spLocks noGrp="1"/>
+          </p:cNvSpPr>
+          <p:nvPr>
+            <p:ph type="title"/>
+          </p:nvPr>
+        </p:nvSpPr>
+        <p:spPr/>
+        <p:txBody>
+          <a:bodyPr/>
+          <a:lstStyle/>
+          <a:p>
+            <a:r>
+              <a:rPr lang="bg-BG" dirty="0" smtClean="0"/>
+              <a:t>За любознателните</a:t>
+            </a:r>
+            <a:endParaRPr lang="en-US" dirty="0"/>
+          </a:p>
+        </p:txBody>
+      </p:sp>
+    </p:spTree>
+  </p:cSld>
+  <p:clrMapOvr>
+    <a:masterClrMapping/>
+  </p:clrMapOvr>
+</p:sld>
+</file>
+
+<file path=ppt/slides/slide13.xml><?xml version="1.0" encoding="utf-8"?>
+<p:sld xmlns:a="http://schemas.openxmlformats.org/drawingml/2006/main" xmlns:r="http://schemas.openxmlformats.org/officeDocument/2006/relationships" xmlns:p="http://schemas.openxmlformats.org/presentationml/2006/main">
+  <p:cSld>
+    <p:spTree>
+      <p:nvGrpSpPr>
+        <p:cNvPr id="1" name=""/>
+        <p:cNvGrpSpPr/>
+        <p:nvPr/>
+      </p:nvGrpSpPr>
+      <p:grpSpPr>
+        <a:xfrm>
+          <a:off x="0" y="0"/>
+          <a:ext cx="0" cy="0"/>
+          <a:chOff x="0" y="0"/>
+          <a:chExt cx="0" cy="0"/>
+        </a:xfrm>
+      </p:grpSpPr>
+      <p:sp>
+        <p:nvSpPr>
+          <p:cNvPr id="3" name="Date Placeholder 2"/>
+          <p:cNvSpPr>
+            <a:spLocks noGrp="1"/>
+          </p:cNvSpPr>
+          <p:nvPr>
+            <p:ph type="dt" sz="half" idx="10"/>
+          </p:nvPr>
+        </p:nvSpPr>
+        <p:spPr/>
+        <p:txBody>
+          <a:bodyPr/>
+          <a:lstStyle/>
+          <a:p>
+            <a:fld id="{4DBE1F54-EC49-4292-B678-A17F961BB737}" type="datetime4">
+              <a:rPr lang="bg-BG" smtClean="0"/>
+              <a:pPr/>
+              <a:t>16 април 2009 г.</a:t>
+            </a:fld>
+            <a:endParaRPr lang="en-US"/>
+          </a:p>
+        </p:txBody>
+      </p:sp>
+      <p:sp>
+        <p:nvSpPr>
+          <p:cNvPr id="4" name="Slide Number Placeholder 3"/>
+          <p:cNvSpPr>
+            <a:spLocks noGrp="1"/>
+          </p:cNvSpPr>
+          <p:nvPr>
+            <p:ph type="sldNum" sz="quarter" idx="12"/>
+          </p:nvPr>
+        </p:nvSpPr>
+        <p:spPr/>
+        <p:txBody>
+          <a:bodyPr/>
+          <a:lstStyle/>
+          <a:p>
+            <a:fld id="{E9FD1C07-6539-4B1B-9734-EADDB64D7A3F}" type="slidenum">
+              <a:rPr lang="en-US" smtClean="0"/>
+              <a:pPr/>
+              <a:t>13</a:t>
+            </a:fld>
+            <a:endParaRPr lang="en-US"/>
+          </a:p>
+        </p:txBody>
+      </p:sp>
+      <p:sp>
+        <p:nvSpPr>
+          <p:cNvPr id="5" name="Title 4"/>
+          <p:cNvSpPr>
+            <a:spLocks noGrp="1"/>
+          </p:cNvSpPr>
+          <p:nvPr>
+            <p:ph type="title"/>
+          </p:nvPr>
+        </p:nvSpPr>
+        <p:spPr/>
+        <p:txBody>
+          <a:bodyPr/>
+          <a:lstStyle/>
+          <a:p>
+            <a:r>
+              <a:rPr lang="bg-BG" dirty="0" smtClean="0"/>
+              <a:t>Въпроси</a:t>
+            </a:r>
+            <a:endParaRPr lang="en-US" dirty="0"/>
+          </a:p>
+        </p:txBody>
+      </p:sp>
+      <p:pic>
+        <p:nvPicPr>
+          <p:cNvPr id="1026" name="Picture 2"/>
+          <p:cNvPicPr>
+            <a:picLocks noGrp="1" noChangeAspect="1" noChangeArrowheads="1"/>
+          </p:cNvPicPr>
+          <p:nvPr>
+            <p:ph idx="1"/>
+          </p:nvPr>
+        </p:nvPicPr>
+        <p:blipFill>
+          <a:blip r:embed="rId2"/>
+          <a:srcRect/>
+          <a:stretch>
+            <a:fillRect/>
+          </a:stretch>
+        </p:blipFill>
+        <p:spPr bwMode="auto">
+          <a:xfrm>
+            <a:off x="3124200" y="2339181"/>
+            <a:ext cx="2895600" cy="3048000"/>
+          </a:xfrm>
+          <a:prstGeom prst="rect">
+            <a:avLst/>
+          </a:prstGeom>
+          <a:noFill/>
+          <a:ln w="9525">
+            <a:noFill/>
+            <a:miter lim="800000"/>
+            <a:headEnd/>
+            <a:tailEnd/>
+          </a:ln>
+          <a:effectLst/>
+        </p:spPr>
+      </p:pic>
+    </p:spTree>
+  </p:cSld>
+  <p:clrMapOvr>
+    <a:masterClrMapping/>
+  </p:clrMapOvr>
+</p:sld>
+</file>
+
 <file path=ppt/slides/slide2.xml><?xml version="1.0" encoding="utf-8"?>
 <p:sld xmlns:a="http://schemas.openxmlformats.org/drawingml/2006/main" xmlns:r="http://schemas.openxmlformats.org/officeDocument/2006/relationships" xmlns:p="http://schemas.openxmlformats.org/presentationml/2006/main">
   <p:cSld>
@@ -5783,7 +6391,7 @@
             <a:fld id="{A754F394-29D4-487E-9FEA-4187CE7DFCCB}" type="datetime4">
               <a:rPr lang="bg-BG" smtClean="0"/>
               <a:pPr/>
-              <a:t>13 април 2009 г.</a:t>
+              <a:t>15 април 2009 г.</a:t>
             </a:fld>
             <a:endParaRPr lang="en-US"/>
           </a:p>
@@ -5971,7 +6579,6 @@
               <a:rPr lang="bg-BG" dirty="0" smtClean="0"/>
               <a:t>Прагматичен</a:t>
             </a:r>
-            <a:endParaRPr lang="bg-BG" dirty="0" smtClean="0"/>
           </a:p>
         </p:txBody>
       </p:sp>
@@ -5993,7 +6600,7 @@
             <a:fld id="{A754F394-29D4-487E-9FEA-4187CE7DFCCB}" type="datetime4">
               <a:rPr lang="bg-BG" smtClean="0"/>
               <a:pPr/>
-              <a:t>13 април 2009 г.</a:t>
+              <a:t>15 април 2009 г.</a:t>
             </a:fld>
             <a:endParaRPr lang="en-US"/>
           </a:p>
@@ -6382,11 +6989,7 @@
             <a:pPr lvl="1"/>
             <a:r>
               <a:rPr lang="bg-BG" dirty="0" smtClean="0"/>
-              <a:t>д</a:t>
-            </a:r>
-            <a:r>
-              <a:rPr lang="bg-BG" dirty="0" smtClean="0"/>
-              <a:t>о голяма степен съвместим с </a:t>
+              <a:t>до голяма степен съвместим с </a:t>
             </a:r>
             <a:r>
               <a:rPr lang="en-US" dirty="0" err="1" smtClean="0"/>
@@ -6430,7 +7033,7 @@
             <a:fld id="{4DBE1F54-EC49-4292-B678-A17F961BB737}" type="datetime4">
               <a:rPr lang="bg-BG" smtClean="0"/>
               <a:pPr/>
-              <a:t>13 април 2009 г.</a:t>
+              <a:t>15 април 2009 г.</a:t>
             </a:fld>
             <a:endParaRPr lang="en-US"/>
           </a:p>
@@ -6546,11 +7149,7 @@
             <a:pPr lvl="1"/>
             <a:r>
               <a:rPr lang="bg-BG" dirty="0" smtClean="0"/>
-              <a:t>б</a:t>
-            </a:r>
-            <a:r>
-              <a:rPr lang="bg-BG" dirty="0" smtClean="0"/>
-              <a:t>ързо сме готови с работещи прототипи;</a:t>
+              <a:t>бързо сме готови с работещи прототипи;</a:t>
             </a:r>
           </a:p>
           <a:p>
@@ -6611,7 +7210,7 @@
             <a:fld id="{4DBE1F54-EC49-4292-B678-A17F961BB737}" type="datetime4">
               <a:rPr lang="bg-BG" smtClean="0"/>
               <a:pPr/>
-              <a:t>13 април 2009 г.</a:t>
+              <a:t>15 април 2009 г.</a:t>
             </a:fld>
             <a:endParaRPr lang="en-US"/>
           </a:p>
@@ -6784,7 +7383,7 @@
             <a:fld id="{4DBE1F54-EC49-4292-B678-A17F961BB737}" type="datetime4">
               <a:rPr lang="bg-BG" smtClean="0"/>
               <a:pPr/>
-              <a:t>13 април 2009 г.</a:t>
+              <a:t>15 април 2009 г.</a:t>
             </a:fld>
             <a:endParaRPr lang="en-US"/>
           </a:p>
@@ -7242,7 +7841,7 @@
             <a:fld id="{4DBE1F54-EC49-4292-B678-A17F961BB737}" type="datetime4">
               <a:rPr lang="bg-BG" smtClean="0"/>
               <a:pPr/>
-              <a:t>13 април 2009 г.</a:t>
+              <a:t>15 април 2009 г.</a:t>
             </a:fld>
             <a:endParaRPr lang="en-US"/>
           </a:p>
@@ -7290,6 +7889,350 @@
             <a:r>
               <a:rPr lang="bg-BG" dirty="0" smtClean="0"/>
               <a:t>Злите мутации</a:t>
+            </a:r>
+            <a:endParaRPr lang="en-US" dirty="0"/>
+          </a:p>
+        </p:txBody>
+      </p:sp>
+    </p:spTree>
+  </p:cSld>
+  <p:clrMapOvr>
+    <a:masterClrMapping/>
+  </p:clrMapOvr>
+</p:sld>
+</file>
+
+<file path=ppt/slides/slide8.xml><?xml version="1.0" encoding="utf-8"?>
+<p:sld xmlns:a="http://schemas.openxmlformats.org/drawingml/2006/main" xmlns:r="http://schemas.openxmlformats.org/officeDocument/2006/relationships" xmlns:p="http://schemas.openxmlformats.org/presentationml/2006/main">
+  <p:cSld>
+    <p:spTree>
+      <p:nvGrpSpPr>
+        <p:cNvPr id="1" name=""/>
+        <p:cNvGrpSpPr/>
+        <p:nvPr/>
+      </p:nvGrpSpPr>
+      <p:grpSpPr>
+        <a:xfrm>
+          <a:off x="0" y="0"/>
+          <a:ext cx="0" cy="0"/>
+          <a:chOff x="0" y="0"/>
+          <a:chExt cx="0" cy="0"/>
+        </a:xfrm>
+      </p:grpSpPr>
+      <p:sp>
+        <p:nvSpPr>
+          <p:cNvPr id="2" name="Content Placeholder 1"/>
+          <p:cNvSpPr>
+            <a:spLocks noGrp="1"/>
+          </p:cNvSpPr>
+          <p:nvPr>
+            <p:ph idx="1"/>
+          </p:nvPr>
+        </p:nvSpPr>
+        <p:spPr/>
+        <p:txBody>
+          <a:bodyPr/>
+          <a:lstStyle/>
+          <a:p>
+            <a:r>
+              <a:rPr lang="bg-BG" dirty="0" smtClean="0"/>
+              <a:t>Декларации с </a:t>
+            </a:r>
+            <a:r>
+              <a:rPr lang="en-US" dirty="0" smtClean="0"/>
+              <a:t>let</a:t>
+            </a:r>
+            <a:endParaRPr lang="bg-BG" dirty="0" smtClean="0"/>
+          </a:p>
+          <a:p>
+            <a:r>
+              <a:rPr lang="bg-BG" dirty="0" smtClean="0"/>
+              <a:t>Функции</a:t>
+            </a:r>
+            <a:endParaRPr lang="en-US" dirty="0" smtClean="0"/>
+          </a:p>
+          <a:p>
+            <a:r>
+              <a:rPr lang="bg-BG" dirty="0" smtClean="0"/>
+              <a:t>Чисти и мутирали данни</a:t>
+            </a:r>
+          </a:p>
+          <a:p>
+            <a:r>
+              <a:rPr lang="bg-BG" dirty="0" smtClean="0"/>
+              <a:t>Примитиви:</a:t>
+            </a:r>
+          </a:p>
+          <a:p>
+            <a:pPr lvl="1"/>
+            <a:r>
+              <a:rPr lang="en-US" dirty="0" err="1" smtClean="0"/>
+              <a:t>Tuples</a:t>
+            </a:r>
+            <a:endParaRPr lang="en-US" dirty="0" smtClean="0"/>
+          </a:p>
+          <a:p>
+            <a:pPr lvl="1"/>
+            <a:r>
+              <a:rPr lang="bg-BG" dirty="0" smtClean="0"/>
+              <a:t>Масиви и списъци</a:t>
+            </a:r>
+          </a:p>
+          <a:p>
+            <a:pPr lvl="1"/>
+            <a:r>
+              <a:rPr lang="bg-BG" dirty="0" smtClean="0"/>
+              <a:t>.</a:t>
+            </a:r>
+            <a:r>
+              <a:rPr lang="en-US" dirty="0" smtClean="0"/>
+              <a:t>NET </a:t>
+            </a:r>
+            <a:r>
+              <a:rPr lang="bg-BG" dirty="0" smtClean="0"/>
+              <a:t>Колекции</a:t>
+            </a:r>
+          </a:p>
+        </p:txBody>
+      </p:sp>
+      <p:sp>
+        <p:nvSpPr>
+          <p:cNvPr id="3" name="Date Placeholder 2"/>
+          <p:cNvSpPr>
+            <a:spLocks noGrp="1"/>
+          </p:cNvSpPr>
+          <p:nvPr>
+            <p:ph type="dt" sz="half" idx="10"/>
+          </p:nvPr>
+        </p:nvSpPr>
+        <p:spPr/>
+        <p:txBody>
+          <a:bodyPr/>
+          <a:lstStyle/>
+          <a:p>
+            <a:fld id="{4DBE1F54-EC49-4292-B678-A17F961BB737}" type="datetime4">
+              <a:rPr lang="bg-BG" smtClean="0"/>
+              <a:pPr/>
+              <a:t>15 април 2009 г.</a:t>
+            </a:fld>
+            <a:endParaRPr lang="en-US"/>
+          </a:p>
+        </p:txBody>
+      </p:sp>
+      <p:sp>
+        <p:nvSpPr>
+          <p:cNvPr id="4" name="Slide Number Placeholder 3"/>
+          <p:cNvSpPr>
+            <a:spLocks noGrp="1"/>
+          </p:cNvSpPr>
+          <p:nvPr>
+            <p:ph type="sldNum" sz="quarter" idx="12"/>
+          </p:nvPr>
+        </p:nvSpPr>
+        <p:spPr/>
+        <p:txBody>
+          <a:bodyPr/>
+          <a:lstStyle/>
+          <a:p>
+            <a:fld id="{E9FD1C07-6539-4B1B-9734-EADDB64D7A3F}" type="slidenum">
+              <a:rPr lang="en-US" smtClean="0"/>
+              <a:pPr/>
+              <a:t>8</a:t>
+            </a:fld>
+            <a:endParaRPr lang="en-US"/>
+          </a:p>
+        </p:txBody>
+      </p:sp>
+      <p:sp>
+        <p:nvSpPr>
+          <p:cNvPr id="5" name="Title 4"/>
+          <p:cNvSpPr>
+            <a:spLocks noGrp="1"/>
+          </p:cNvSpPr>
+          <p:nvPr>
+            <p:ph type="title"/>
+          </p:nvPr>
+        </p:nvSpPr>
+        <p:spPr/>
+        <p:txBody>
+          <a:bodyPr/>
+          <a:lstStyle/>
+          <a:p>
+            <a:r>
+              <a:rPr lang="bg-BG" dirty="0" smtClean="0"/>
+              <a:t>Демо 1 – Основи</a:t>
+            </a:r>
+            <a:endParaRPr lang="en-US" dirty="0"/>
+          </a:p>
+        </p:txBody>
+      </p:sp>
+    </p:spTree>
+  </p:cSld>
+  <p:clrMapOvr>
+    <a:masterClrMapping/>
+  </p:clrMapOvr>
+</p:sld>
+</file>
+
+<file path=ppt/slides/slide9.xml><?xml version="1.0" encoding="utf-8"?>
+<p:sld xmlns:a="http://schemas.openxmlformats.org/drawingml/2006/main" xmlns:r="http://schemas.openxmlformats.org/officeDocument/2006/relationships" xmlns:p="http://schemas.openxmlformats.org/presentationml/2006/main">
+  <p:cSld>
+    <p:spTree>
+      <p:nvGrpSpPr>
+        <p:cNvPr id="1" name=""/>
+        <p:cNvGrpSpPr/>
+        <p:nvPr/>
+      </p:nvGrpSpPr>
+      <p:grpSpPr>
+        <a:xfrm>
+          <a:off x="0" y="0"/>
+          <a:ext cx="0" cy="0"/>
+          <a:chOff x="0" y="0"/>
+          <a:chExt cx="0" cy="0"/>
+        </a:xfrm>
+      </p:grpSpPr>
+      <p:sp>
+        <p:nvSpPr>
+          <p:cNvPr id="2" name="Content Placeholder 1"/>
+          <p:cNvSpPr>
+            <a:spLocks noGrp="1"/>
+          </p:cNvSpPr>
+          <p:nvPr>
+            <p:ph idx="1"/>
+          </p:nvPr>
+        </p:nvSpPr>
+        <p:spPr/>
+        <p:txBody>
+          <a:bodyPr/>
+          <a:lstStyle/>
+          <a:p>
+            <a:r>
+              <a:rPr lang="bg-BG" dirty="0" smtClean="0"/>
+              <a:t>Всички функции имат един параметър!</a:t>
+            </a:r>
+          </a:p>
+          <a:p>
+            <a:pPr lvl="1"/>
+            <a:r>
+              <a:rPr lang="en-US" dirty="0" smtClean="0"/>
+              <a:t>Currying</a:t>
+            </a:r>
+          </a:p>
+          <a:p>
+            <a:r>
+              <a:rPr lang="bg-BG" dirty="0" smtClean="0"/>
+              <a:t>Навързване на функции: операторът </a:t>
+            </a:r>
+            <a:r>
+              <a:rPr lang="en-US" dirty="0" smtClean="0">
+                <a:solidFill>
+                  <a:schemeClr val="accent5">
+                    <a:lumMod val="75000"/>
+                  </a:schemeClr>
+                </a:solidFill>
+              </a:rPr>
+              <a:t>|</a:t>
+            </a:r>
+            <a:r>
+              <a:rPr lang="bg-BG" dirty="0" smtClean="0">
+                <a:solidFill>
+                  <a:schemeClr val="accent5">
+                    <a:lumMod val="75000"/>
+                  </a:schemeClr>
+                </a:solidFill>
+              </a:rPr>
+              <a:t>&gt;</a:t>
+            </a:r>
+            <a:endParaRPr lang="en-US" dirty="0" smtClean="0">
+              <a:solidFill>
+                <a:schemeClr val="accent5">
+                  <a:lumMod val="75000"/>
+                </a:schemeClr>
+              </a:solidFill>
+            </a:endParaRPr>
+          </a:p>
+          <a:p>
+            <a:r>
+              <a:rPr lang="bg-BG" dirty="0" smtClean="0"/>
+              <a:t>Рекурсия</a:t>
+            </a:r>
+          </a:p>
+          <a:p>
+            <a:pPr lvl="1"/>
+            <a:r>
+              <a:rPr lang="bg-BG" dirty="0" smtClean="0"/>
+              <a:t>“Опашата” рекурсия</a:t>
+            </a:r>
+            <a:endParaRPr lang="en-US" dirty="0"/>
+          </a:p>
+        </p:txBody>
+      </p:sp>
+      <p:sp>
+        <p:nvSpPr>
+          <p:cNvPr id="3" name="Date Placeholder 2"/>
+          <p:cNvSpPr>
+            <a:spLocks noGrp="1"/>
+          </p:cNvSpPr>
+          <p:nvPr>
+            <p:ph type="dt" sz="half" idx="10"/>
+          </p:nvPr>
+        </p:nvSpPr>
+        <p:spPr/>
+        <p:txBody>
+          <a:bodyPr/>
+          <a:lstStyle/>
+          <a:p>
+            <a:fld id="{4DBE1F54-EC49-4292-B678-A17F961BB737}" type="datetime4">
+              <a:rPr lang="bg-BG" smtClean="0"/>
+              <a:pPr/>
+              <a:t>16 април 2009 г.</a:t>
+            </a:fld>
+            <a:endParaRPr lang="en-US"/>
+          </a:p>
+        </p:txBody>
+      </p:sp>
+      <p:sp>
+        <p:nvSpPr>
+          <p:cNvPr id="4" name="Slide Number Placeholder 3"/>
+          <p:cNvSpPr>
+            <a:spLocks noGrp="1"/>
+          </p:cNvSpPr>
+          <p:nvPr>
+            <p:ph type="sldNum" sz="quarter" idx="12"/>
+          </p:nvPr>
+        </p:nvSpPr>
+        <p:spPr/>
+        <p:txBody>
+          <a:bodyPr/>
+          <a:lstStyle/>
+          <a:p>
+            <a:fld id="{E9FD1C07-6539-4B1B-9734-EADDB64D7A3F}" type="slidenum">
+              <a:rPr lang="en-US" smtClean="0"/>
+              <a:pPr/>
+              <a:t>9</a:t>
+            </a:fld>
+            <a:endParaRPr lang="en-US"/>
+          </a:p>
+        </p:txBody>
+      </p:sp>
+      <p:sp>
+        <p:nvSpPr>
+          <p:cNvPr id="5" name="Title 4"/>
+          <p:cNvSpPr>
+            <a:spLocks noGrp="1"/>
+          </p:cNvSpPr>
+          <p:nvPr>
+            <p:ph type="title"/>
+          </p:nvPr>
+        </p:nvSpPr>
+        <p:spPr/>
+        <p:txBody>
+          <a:bodyPr/>
+          <a:lstStyle/>
+          <a:p>
+            <a:r>
+              <a:rPr lang="bg-BG" dirty="0" smtClean="0"/>
+              <a:t>Демо 2 – магия с функции</a:t>
             </a:r>
             <a:endParaRPr lang="en-US" dirty="0"/>
           </a:p>

</xml_diff>

<commit_message>
added the OOP demo -- WinForms baby!
</commit_message>
<xml_diff>
--- a/MSDays09_HristoDeshev.pptx
+++ b/MSDays09_HristoDeshev.pptx
@@ -5799,11 +5799,7 @@
             <a:pPr lvl="1"/>
             <a:r>
               <a:rPr lang="bg-BG" dirty="0" smtClean="0"/>
-              <a:t>Кратки и експресивни</a:t>
-            </a:r>
-            <a:r>
-              <a:rPr lang="bg-BG" dirty="0" smtClean="0"/>
-              <a:t>.</a:t>
+              <a:t>Кратки и експресивни.</a:t>
             </a:r>
             <a:endParaRPr lang="en-US" dirty="0" smtClean="0"/>
           </a:p>
@@ -5813,17 +5809,12 @@
               <a:rPr lang="bg-BG" dirty="0" smtClean="0"/>
               <a:t>“Надзиравани” от компилатора</a:t>
             </a:r>
-            <a:endParaRPr lang="bg-BG" dirty="0" smtClean="0"/>
           </a:p>
           <a:p>
             <a:pPr lvl="1"/>
             <a:r>
               <a:rPr lang="bg-BG" dirty="0" smtClean="0"/>
-              <a:t>Разширяеми</a:t>
-            </a:r>
-            <a:r>
-              <a:rPr lang="bg-BG" dirty="0" smtClean="0"/>
-              <a:t>.</a:t>
+              <a:t>Разширяеми.</a:t>
             </a:r>
             <a:endParaRPr lang="en-US" dirty="0" smtClean="0"/>
           </a:p>
@@ -6147,15 +6138,7 @@
           <a:p>
             <a:r>
               <a:rPr lang="bg-BG" dirty="0" smtClean="0"/>
-              <a:t>Безплатна </a:t>
-            </a:r>
-            <a:r>
-              <a:rPr lang="bg-BG" dirty="0" smtClean="0"/>
-              <a:t>уики-книга</a:t>
-            </a:r>
-            <a:r>
-              <a:rPr lang="bg-BG" dirty="0" smtClean="0"/>
-              <a:t>: </a:t>
+              <a:t>Безплатна уики-книга: </a:t>
             </a:r>
             <a:r>
               <a:rPr lang="en-US" sz="2400" dirty="0" smtClean="0">
@@ -6518,16 +6501,7 @@
                 </a:solidFill>
                 <a:latin typeface="Calibri" pitchFamily="34" charset="0"/>
               </a:rPr>
-              <a:t>Христо </a:t>
-            </a:r>
-            <a:r>
-              <a:rPr lang="bg-BG" sz="4000" b="1" dirty="0" smtClean="0">
-                <a:solidFill>
-                  <a:srgbClr val="898989"/>
-                </a:solidFill>
-                <a:latin typeface="Calibri" pitchFamily="34" charset="0"/>
-              </a:rPr>
-              <a:t>Дешев</a:t>
+              <a:t>Христо Дешев</a:t>
             </a:r>
           </a:p>
           <a:p>
@@ -6664,11 +6638,7 @@
           <a:p>
             <a:r>
               <a:rPr lang="bg-BG" dirty="0" smtClean="0"/>
-              <a:t>Стъпил </a:t>
-            </a:r>
-            <a:r>
-              <a:rPr lang="bg-BG" dirty="0" smtClean="0"/>
-              <a:t>върху .</a:t>
+              <a:t>Стъпил върху .</a:t>
             </a:r>
             <a:r>
               <a:rPr lang="en-US" dirty="0" smtClean="0"/>

</xml_diff>

<commit_message>
done with slides added active patterns to the pattern matching demos
</commit_message>
<xml_diff>
--- a/MSDays09_HristoDeshev.pptx
+++ b/MSDays09_HristoDeshev.pptx
@@ -5,7 +5,7 @@
     <p:sldMasterId id="2147483648" r:id="rId1"/>
   </p:sldMasterIdLst>
   <p:notesMasterIdLst>
-    <p:notesMasterId r:id="rId15"/>
+    <p:notesMasterId r:id="rId16"/>
   </p:notesMasterIdLst>
   <p:sldIdLst>
     <p:sldId id="256" r:id="rId2"/>
@@ -14,13 +14,14 @@
     <p:sldId id="259" r:id="rId5"/>
     <p:sldId id="261" r:id="rId6"/>
     <p:sldId id="260" r:id="rId7"/>
-    <p:sldId id="262" r:id="rId8"/>
-    <p:sldId id="263" r:id="rId9"/>
-    <p:sldId id="264" r:id="rId10"/>
-    <p:sldId id="265" r:id="rId11"/>
-    <p:sldId id="266" r:id="rId12"/>
-    <p:sldId id="267" r:id="rId13"/>
-    <p:sldId id="268" r:id="rId14"/>
+    <p:sldId id="269" r:id="rId8"/>
+    <p:sldId id="262" r:id="rId9"/>
+    <p:sldId id="263" r:id="rId10"/>
+    <p:sldId id="264" r:id="rId11"/>
+    <p:sldId id="265" r:id="rId12"/>
+    <p:sldId id="266" r:id="rId13"/>
+    <p:sldId id="267" r:id="rId14"/>
+    <p:sldId id="268" r:id="rId15"/>
   </p:sldIdLst>
   <p:sldSz cx="9144000" cy="6858000" type="screen4x3"/>
   <p:notesSz cx="6858000" cy="9144000"/>
@@ -205,7 +206,7 @@
             <a:fld id="{E9B90EA8-0933-4830-B8D7-AF106ED53158}" type="datetimeFigureOut">
               <a:rPr lang="en-US" smtClean="0"/>
               <a:pPr/>
-              <a:t>4/16/2009</a:t>
+              <a:t>4/17/2009</a:t>
             </a:fld>
             <a:endParaRPr lang="en-US"/>
           </a:p>
@@ -545,7 +546,7 @@
             <a:fld id="{B1E722B2-FF8C-4E07-8F66-B68AE76DF7F3}" type="datetime4">
               <a:rPr lang="bg-BG" smtClean="0"/>
               <a:pPr/>
-              <a:t>16 април 2009 г.</a:t>
+              <a:t>17 април 2009 г.</a:t>
             </a:fld>
             <a:endParaRPr lang="en-US"/>
           </a:p>
@@ -928,7 +929,7 @@
             <a:fld id="{B0BB7772-550A-4FE5-83AA-31D5ECE54342}" type="datetime4">
               <a:rPr lang="bg-BG" smtClean="0"/>
               <a:pPr/>
-              <a:t>16 април 2009 г.</a:t>
+              <a:t>17 април 2009 г.</a:t>
             </a:fld>
             <a:endParaRPr lang="en-US"/>
           </a:p>
@@ -1299,7 +1300,7 @@
             <a:fld id="{C4CF66DF-71B1-497A-9CF6-B146A9E3F7FE}" type="datetime4">
               <a:rPr lang="bg-BG" smtClean="0"/>
               <a:pPr/>
-              <a:t>16 април 2009 г.</a:t>
+              <a:t>17 април 2009 г.</a:t>
             </a:fld>
             <a:endParaRPr lang="en-US"/>
           </a:p>
@@ -1721,7 +1722,7 @@
             <a:fld id="{4DBE1F54-EC49-4292-B678-A17F961BB737}" type="datetime4">
               <a:rPr lang="bg-BG" smtClean="0"/>
               <a:pPr/>
-              <a:t>16 април 2009 г.</a:t>
+              <a:t>17 април 2009 г.</a:t>
             </a:fld>
             <a:endParaRPr lang="en-US"/>
           </a:p>
@@ -2193,7 +2194,7 @@
             <a:fld id="{C8CDDBCB-7A68-44AB-B22D-E6A87E33AA73}" type="datetime4">
               <a:rPr lang="bg-BG" smtClean="0"/>
               <a:pPr/>
-              <a:t>16 април 2009 г.</a:t>
+              <a:t>17 април 2009 г.</a:t>
             </a:fld>
             <a:endParaRPr lang="en-US"/>
           </a:p>
@@ -2644,7 +2645,7 @@
             <a:fld id="{30F1E36E-C33D-4D17-9CF1-A80564111F40}" type="datetime4">
               <a:rPr lang="bg-BG" smtClean="0"/>
               <a:pPr/>
-              <a:t>16 април 2009 г.</a:t>
+              <a:t>17 април 2009 г.</a:t>
             </a:fld>
             <a:endParaRPr lang="en-US"/>
           </a:p>
@@ -3258,7 +3259,7 @@
             <a:fld id="{EE1E4F47-7C80-4EFC-8FCB-C718C12F32D4}" type="datetime4">
               <a:rPr lang="bg-BG" smtClean="0"/>
               <a:pPr/>
-              <a:t>16 април 2009 г.</a:t>
+              <a:t>17 април 2009 г.</a:t>
             </a:fld>
             <a:endParaRPr lang="en-US"/>
           </a:p>
@@ -3572,7 +3573,7 @@
             <a:fld id="{6A5E1B13-3A6D-4B8E-AF03-819C9B0CEB52}" type="datetime4">
               <a:rPr lang="bg-BG" smtClean="0"/>
               <a:pPr/>
-              <a:t>16 април 2009 г.</a:t>
+              <a:t>17 април 2009 г.</a:t>
             </a:fld>
             <a:endParaRPr lang="en-US"/>
           </a:p>
@@ -3886,7 +3887,7 @@
             <a:fld id="{A754F394-29D4-487E-9FEA-4187CE7DFCCB}" type="datetime4">
               <a:rPr lang="bg-BG" smtClean="0"/>
               <a:pPr/>
-              <a:t>16 април 2009 г.</a:t>
+              <a:t>17 април 2009 г.</a:t>
             </a:fld>
             <a:endParaRPr lang="en-US"/>
           </a:p>
@@ -4352,7 +4353,7 @@
             <a:fld id="{C2CB05D6-916D-49CB-931D-17709F1C58DB}" type="datetime4">
               <a:rPr lang="bg-BG" smtClean="0"/>
               <a:pPr/>
-              <a:t>16 април 2009 г.</a:t>
+              <a:t>17 април 2009 г.</a:t>
             </a:fld>
             <a:endParaRPr lang="en-US"/>
           </a:p>
@@ -4794,7 +4795,7 @@
             <a:fld id="{B812156F-4489-47C0-BF90-2A1A0F8AB9F1}" type="datetime4">
               <a:rPr lang="bg-BG" smtClean="0"/>
               <a:pPr/>
-              <a:t>16 април 2009 г.</a:t>
+              <a:t>17 април 2009 г.</a:t>
             </a:fld>
             <a:endParaRPr lang="en-US"/>
           </a:p>
@@ -5158,7 +5159,7 @@
             <a:fld id="{A732CE53-D585-4572-A7E1-6BFB4A413506}" type="datetime4">
               <a:rPr lang="bg-BG" smtClean="0"/>
               <a:pPr/>
-              <a:t>16 април 2009 г.</a:t>
+              <a:t>17 април 2009 г.</a:t>
             </a:fld>
             <a:endParaRPr lang="en-US"/>
           </a:p>
@@ -5787,40 +5788,63 @@
           <a:lstStyle/>
           <a:p>
             <a:r>
+              <a:rPr lang="bg-BG" dirty="0" smtClean="0"/>
+              <a:t>Всички функции имат един параметър!</a:t>
+            </a:r>
+          </a:p>
+          <a:p>
+            <a:pPr lvl="1"/>
+            <a:r>
               <a:rPr lang="en-US" dirty="0" smtClean="0"/>
-              <a:t>Switch</a:t>
-            </a:r>
+              <a:t>Currying</a:t>
+            </a:r>
+          </a:p>
+          <a:p>
             <a:r>
               <a:rPr lang="bg-BG" dirty="0" smtClean="0"/>
-              <a:t> на стероиди</a:t>
+              <a:t>Навързване на функции: операторът </a:t>
+            </a:r>
+            <a:r>
+              <a:rPr lang="en-US" dirty="0" smtClean="0">
+                <a:solidFill>
+                  <a:schemeClr val="accent5">
+                    <a:lumMod val="75000"/>
+                  </a:schemeClr>
+                </a:solidFill>
+              </a:rPr>
+              <a:t>|</a:t>
+            </a:r>
+            <a:r>
+              <a:rPr lang="bg-BG" dirty="0" smtClean="0">
+                <a:solidFill>
+                  <a:schemeClr val="accent5">
+                    <a:lumMod val="75000"/>
+                  </a:schemeClr>
+                </a:solidFill>
+              </a:rPr>
+              <a:t>&gt;</a:t>
+            </a:r>
+            <a:endParaRPr lang="en-US" dirty="0" smtClean="0">
+              <a:solidFill>
+                <a:schemeClr val="accent5">
+                  <a:lumMod val="75000"/>
+                </a:schemeClr>
+              </a:solidFill>
+            </a:endParaRPr>
+          </a:p>
+          <a:p>
+            <a:r>
+              <a:rPr lang="bg-BG" dirty="0" smtClean="0"/>
+              <a:t>Рекурсия</a:t>
             </a:r>
           </a:p>
           <a:p>
             <a:pPr lvl="1"/>
             <a:r>
               <a:rPr lang="bg-BG" dirty="0" smtClean="0"/>
-              <a:t>Кратки и експресивни.</a:t>
-            </a:r>
-            <a:endParaRPr lang="en-US" dirty="0" smtClean="0"/>
-          </a:p>
-          <a:p>
-            <a:pPr lvl="1"/>
-            <a:r>
-              <a:rPr lang="bg-BG" dirty="0" smtClean="0"/>
-              <a:t>“Надзиравани” от компилатора</a:t>
-            </a:r>
-          </a:p>
-          <a:p>
-            <a:pPr lvl="1"/>
-            <a:r>
-              <a:rPr lang="bg-BG" dirty="0" smtClean="0"/>
-              <a:t>Разширяеми.</a:t>
-            </a:r>
-            <a:endParaRPr lang="en-US" dirty="0" smtClean="0"/>
-          </a:p>
-          <a:p>
-            <a:pPr lvl="1"/>
-            <a:endParaRPr lang="bg-BG" dirty="0" smtClean="0"/>
+              <a:t>“Опашата” рекурсия</a:t>
+            </a:r>
+            <a:endParaRPr lang="en-US" dirty="0"/>
           </a:p>
         </p:txBody>
       </p:sp>
@@ -5842,7 +5866,7 @@
             <a:fld id="{4DBE1F54-EC49-4292-B678-A17F961BB737}" type="datetime4">
               <a:rPr lang="bg-BG" smtClean="0"/>
               <a:pPr/>
-              <a:t>16 април 2009 г.</a:t>
+              <a:t>17 април 2009 г.</a:t>
             </a:fld>
             <a:endParaRPr lang="en-US"/>
           </a:p>
@@ -5888,8 +5912,8 @@
           <a:lstStyle/>
           <a:p>
             <a:r>
-              <a:rPr lang="en-US" dirty="0" smtClean="0"/>
-              <a:t>Demo 3 – Pattern Matching</a:t>
+              <a:rPr lang="bg-BG" dirty="0" smtClean="0"/>
+              <a:t>Демо 2 – магия с функции</a:t>
             </a:r>
             <a:endParaRPr lang="en-US" dirty="0"/>
           </a:p>
@@ -5900,6 +5924,13 @@
   <p:clrMapOvr>
     <a:masterClrMapping/>
   </p:clrMapOvr>
+  <p:timing>
+    <p:tnLst>
+      <p:par>
+        <p:cTn id="1" dur="indefinite" restart="never" nodeType="tmRoot"/>
+      </p:par>
+    </p:tnLst>
+  </p:timing>
 </p:sld>
 </file>
 
@@ -5936,26 +5967,40 @@
           <a:lstStyle/>
           <a:p>
             <a:r>
+              <a:rPr lang="en-US" dirty="0" smtClean="0"/>
+              <a:t>Switch</a:t>
+            </a:r>
+            <a:r>
               <a:rPr lang="bg-BG" dirty="0" smtClean="0"/>
-              <a:t>Деклариране на класове</a:t>
-            </a:r>
-          </a:p>
-          <a:p>
+              <a:t> на стероиди</a:t>
+            </a:r>
+          </a:p>
+          <a:p>
+            <a:pPr lvl="1"/>
             <a:r>
               <a:rPr lang="bg-BG" dirty="0" smtClean="0"/>
-              <a:t>Имплементиране на интерфейси</a:t>
-            </a:r>
-          </a:p>
-          <a:p>
+              <a:t>Кратки и експресивни.</a:t>
+            </a:r>
+            <a:endParaRPr lang="en-US" dirty="0" smtClean="0"/>
+          </a:p>
+          <a:p>
+            <a:pPr lvl="1"/>
             <a:r>
               <a:rPr lang="bg-BG" dirty="0" smtClean="0"/>
-              <a:t>Демо – </a:t>
-            </a:r>
-            <a:r>
-              <a:rPr lang="en-US" dirty="0" err="1" smtClean="0"/>
-              <a:t>WinForms</a:t>
+              <a:t>“Надзиравани” от компилатора</a:t>
+            </a:r>
+          </a:p>
+          <a:p>
+            <a:pPr lvl="1"/>
+            <a:r>
+              <a:rPr lang="bg-BG" dirty="0" smtClean="0"/>
+              <a:t>Разширяеми.</a:t>
             </a:r>
             <a:endParaRPr lang="en-US" dirty="0" smtClean="0"/>
+          </a:p>
+          <a:p>
+            <a:pPr lvl="1"/>
+            <a:endParaRPr lang="bg-BG" dirty="0" smtClean="0"/>
           </a:p>
         </p:txBody>
       </p:sp>
@@ -5977,7 +6022,7 @@
             <a:fld id="{4DBE1F54-EC49-4292-B678-A17F961BB737}" type="datetime4">
               <a:rPr lang="bg-BG" smtClean="0"/>
               <a:pPr/>
-              <a:t>16 април 2009 г.</a:t>
+              <a:t>17 април 2009 г.</a:t>
             </a:fld>
             <a:endParaRPr lang="en-US"/>
           </a:p>
@@ -6019,21 +6064,12 @@
         </p:nvSpPr>
         <p:spPr/>
         <p:txBody>
-          <a:bodyPr>
-            <a:normAutofit fontScale="90000"/>
-          </a:bodyPr>
-          <a:lstStyle/>
-          <a:p>
-            <a:r>
-              <a:rPr lang="bg-BG" dirty="0" smtClean="0"/>
-              <a:t>Обектно ориентирано </a:t>
-            </a:r>
-            <a:br>
-              <a:rPr lang="bg-BG" dirty="0" smtClean="0"/>
-            </a:br>
-            <a:r>
-              <a:rPr lang="bg-BG" dirty="0" smtClean="0"/>
-              <a:t>програмиране</a:t>
+          <a:bodyPr/>
+          <a:lstStyle/>
+          <a:p>
+            <a:r>
+              <a:rPr lang="en-US" dirty="0" smtClean="0"/>
+              <a:t>Demo 3 – Pattern Matching</a:t>
             </a:r>
             <a:endParaRPr lang="en-US" dirty="0"/>
           </a:p>
@@ -6044,6 +6080,13 @@
   <p:clrMapOvr>
     <a:masterClrMapping/>
   </p:clrMapOvr>
+  <p:timing>
+    <p:tnLst>
+      <p:par>
+        <p:cTn id="1" dur="indefinite" restart="never" nodeType="tmRoot"/>
+      </p:par>
+    </p:tnLst>
+  </p:timing>
 </p:sld>
 </file>
 
@@ -6081,75 +6124,25 @@
           <a:p>
             <a:r>
               <a:rPr lang="bg-BG" dirty="0" smtClean="0"/>
-              <a:t>Най-добрата книга: </a:t>
-            </a:r>
-            <a:r>
-              <a:rPr lang="en-US" dirty="0" smtClean="0"/>
-              <a:t>Expert F#</a:t>
-            </a:r>
+              <a:t>Деклариране на класове</a:t>
+            </a:r>
+          </a:p>
+          <a:p>
             <a:r>
               <a:rPr lang="bg-BG" dirty="0" smtClean="0"/>
-              <a:t> от </a:t>
-            </a:r>
-            <a:r>
-              <a:rPr lang="en-US" dirty="0" smtClean="0"/>
-              <a:t>Don </a:t>
+              <a:t>Имплементиране на интерфейси</a:t>
+            </a:r>
+          </a:p>
+          <a:p>
+            <a:r>
+              <a:rPr lang="bg-BG" dirty="0" smtClean="0"/>
+              <a:t>Демо – </a:t>
             </a:r>
             <a:r>
               <a:rPr lang="en-US" dirty="0" err="1" smtClean="0"/>
-              <a:t>Syme</a:t>
-            </a:r>
-            <a:r>
-              <a:rPr lang="en-US" dirty="0" smtClean="0"/>
-              <a:t>, Adam </a:t>
-            </a:r>
-            <a:r>
-              <a:rPr lang="en-US" dirty="0" err="1" smtClean="0"/>
-              <a:t>Granicz</a:t>
-            </a:r>
-            <a:r>
-              <a:rPr lang="en-US" dirty="0" smtClean="0"/>
-              <a:t>, Antonio </a:t>
-            </a:r>
-            <a:r>
-              <a:rPr lang="en-US" dirty="0" err="1" smtClean="0"/>
-              <a:t>Cisternino</a:t>
-            </a:r>
-            <a:endParaRPr lang="bg-BG" dirty="0" smtClean="0"/>
-          </a:p>
-          <a:p>
-            <a:r>
-              <a:rPr lang="bg-BG" dirty="0" smtClean="0"/>
-              <a:t>Много добър увод: </a:t>
-            </a:r>
-            <a:r>
-              <a:rPr lang="en-US" dirty="0" smtClean="0"/>
-              <a:t>Foundations of F# </a:t>
-            </a:r>
-            <a:r>
-              <a:rPr lang="bg-BG" dirty="0" smtClean="0"/>
-              <a:t>от </a:t>
-            </a:r>
-            <a:r>
-              <a:rPr lang="en-US" dirty="0" smtClean="0"/>
-              <a:t>Robert Pickering</a:t>
-            </a:r>
-          </a:p>
-          <a:p>
-            <a:r>
-              <a:rPr lang="bg-BG" dirty="0" smtClean="0"/>
-              <a:t>Безплатна уики-книга: </a:t>
-            </a:r>
-            <a:r>
-              <a:rPr lang="en-US" sz="2400" dirty="0" smtClean="0">
-                <a:hlinkClick r:id="rId2"/>
-              </a:rPr>
-              <a:t>http://en.wikibooks.org/wiki/F_Sharp_Programming</a:t>
-            </a:r>
-            <a:endParaRPr lang="bg-BG" sz="2400" dirty="0" smtClean="0"/>
-          </a:p>
-          <a:p>
-            <a:endParaRPr lang="en-US" dirty="0"/>
+              <a:t>WinForms</a:t>
+            </a:r>
+            <a:endParaRPr lang="en-US" dirty="0" smtClean="0"/>
           </a:p>
         </p:txBody>
       </p:sp>
@@ -6171,7 +6164,7 @@
             <a:fld id="{4DBE1F54-EC49-4292-B678-A17F961BB737}" type="datetime4">
               <a:rPr lang="bg-BG" smtClean="0"/>
               <a:pPr/>
-              <a:t>16 април 2009 г.</a:t>
+              <a:t>17 април 2009 г.</a:t>
             </a:fld>
             <a:endParaRPr lang="en-US"/>
           </a:p>
@@ -6213,12 +6206,21 @@
         </p:nvSpPr>
         <p:spPr/>
         <p:txBody>
-          <a:bodyPr/>
+          <a:bodyPr>
+            <a:normAutofit fontScale="90000"/>
+          </a:bodyPr>
           <a:lstStyle/>
           <a:p>
             <a:r>
               <a:rPr lang="bg-BG" dirty="0" smtClean="0"/>
-              <a:t>За любознателните</a:t>
+              <a:t>Обектно ориентирано </a:t>
+            </a:r>
+            <a:br>
+              <a:rPr lang="bg-BG" dirty="0" smtClean="0"/>
+            </a:br>
+            <a:r>
+              <a:rPr lang="bg-BG" dirty="0" smtClean="0"/>
+              <a:t>програмиране</a:t>
             </a:r>
             <a:endParaRPr lang="en-US" dirty="0"/>
           </a:p>
@@ -6229,6 +6231,13 @@
   <p:clrMapOvr>
     <a:masterClrMapping/>
   </p:clrMapOvr>
+  <p:timing>
+    <p:tnLst>
+      <p:par>
+        <p:cTn id="1" dur="indefinite" restart="never" nodeType="tmRoot"/>
+      </p:par>
+    </p:tnLst>
+  </p:timing>
 </p:sld>
 </file>
 
@@ -6251,6 +6260,95 @@
       </p:grpSpPr>
       <p:sp>
         <p:nvSpPr>
+          <p:cNvPr id="2" name="Content Placeholder 1"/>
+          <p:cNvSpPr>
+            <a:spLocks noGrp="1"/>
+          </p:cNvSpPr>
+          <p:nvPr>
+            <p:ph idx="1"/>
+          </p:nvPr>
+        </p:nvSpPr>
+        <p:spPr/>
+        <p:txBody>
+          <a:bodyPr/>
+          <a:lstStyle/>
+          <a:p>
+            <a:r>
+              <a:rPr lang="bg-BG" dirty="0" smtClean="0"/>
+              <a:t>Най-добрата книга: </a:t>
+            </a:r>
+            <a:r>
+              <a:rPr lang="en-US" dirty="0" smtClean="0"/>
+              <a:t>Expert F#</a:t>
+            </a:r>
+            <a:r>
+              <a:rPr lang="bg-BG" dirty="0" smtClean="0"/>
+              <a:t> от </a:t>
+            </a:r>
+            <a:r>
+              <a:rPr lang="en-US" dirty="0" smtClean="0"/>
+              <a:t>Don </a:t>
+            </a:r>
+            <a:r>
+              <a:rPr lang="en-US" dirty="0" err="1" smtClean="0"/>
+              <a:t>Syme</a:t>
+            </a:r>
+            <a:r>
+              <a:rPr lang="en-US" dirty="0" smtClean="0"/>
+              <a:t>, Adam </a:t>
+            </a:r>
+            <a:r>
+              <a:rPr lang="en-US" dirty="0" err="1" smtClean="0"/>
+              <a:t>Granicz</a:t>
+            </a:r>
+            <a:r>
+              <a:rPr lang="en-US" dirty="0" smtClean="0"/>
+              <a:t>, Antonio </a:t>
+            </a:r>
+            <a:r>
+              <a:rPr lang="en-US" dirty="0" err="1" smtClean="0"/>
+              <a:t>Cisternino</a:t>
+            </a:r>
+            <a:endParaRPr lang="bg-BG" dirty="0" smtClean="0"/>
+          </a:p>
+          <a:p>
+            <a:r>
+              <a:rPr lang="bg-BG" dirty="0" smtClean="0"/>
+              <a:t>Много добър увод: </a:t>
+            </a:r>
+            <a:r>
+              <a:rPr lang="en-US" dirty="0" smtClean="0"/>
+              <a:t>Foundations of F# </a:t>
+            </a:r>
+            <a:r>
+              <a:rPr lang="bg-BG" dirty="0" smtClean="0"/>
+              <a:t>от </a:t>
+            </a:r>
+            <a:r>
+              <a:rPr lang="en-US" dirty="0" smtClean="0"/>
+              <a:t>Robert Pickering</a:t>
+            </a:r>
+          </a:p>
+          <a:p>
+            <a:r>
+              <a:rPr lang="bg-BG" dirty="0" smtClean="0"/>
+              <a:t>Безплатна уики-книга: </a:t>
+            </a:r>
+            <a:r>
+              <a:rPr lang="en-US" sz="2400" dirty="0" smtClean="0">
+                <a:hlinkClick r:id="rId2"/>
+              </a:rPr>
+              <a:t>http://en.wikibooks.org/wiki/F_Sharp_Programming</a:t>
+            </a:r>
+            <a:endParaRPr lang="bg-BG" sz="2400" dirty="0" smtClean="0"/>
+          </a:p>
+          <a:p>
+            <a:endParaRPr lang="en-US" dirty="0"/>
+          </a:p>
+        </p:txBody>
+      </p:sp>
+      <p:sp>
+        <p:nvSpPr>
           <p:cNvPr id="3" name="Date Placeholder 2"/>
           <p:cNvSpPr>
             <a:spLocks noGrp="1"/>
@@ -6267,7 +6365,7 @@
             <a:fld id="{4DBE1F54-EC49-4292-B678-A17F961BB737}" type="datetime4">
               <a:rPr lang="bg-BG" smtClean="0"/>
               <a:pPr/>
-              <a:t>16 април 2009 г.</a:t>
+              <a:t>17 април 2009 г.</a:t>
             </a:fld>
             <a:endParaRPr lang="en-US"/>
           </a:p>
@@ -6292,6 +6390,109 @@
               <a:rPr lang="en-US" smtClean="0"/>
               <a:pPr/>
               <a:t>13</a:t>
+            </a:fld>
+            <a:endParaRPr lang="en-US"/>
+          </a:p>
+        </p:txBody>
+      </p:sp>
+      <p:sp>
+        <p:nvSpPr>
+          <p:cNvPr id="5" name="Title 4"/>
+          <p:cNvSpPr>
+            <a:spLocks noGrp="1"/>
+          </p:cNvSpPr>
+          <p:nvPr>
+            <p:ph type="title"/>
+          </p:nvPr>
+        </p:nvSpPr>
+        <p:spPr/>
+        <p:txBody>
+          <a:bodyPr/>
+          <a:lstStyle/>
+          <a:p>
+            <a:r>
+              <a:rPr lang="bg-BG" dirty="0" smtClean="0"/>
+              <a:t>За любознателните</a:t>
+            </a:r>
+            <a:endParaRPr lang="en-US" dirty="0"/>
+          </a:p>
+        </p:txBody>
+      </p:sp>
+    </p:spTree>
+  </p:cSld>
+  <p:clrMapOvr>
+    <a:masterClrMapping/>
+  </p:clrMapOvr>
+  <p:timing>
+    <p:tnLst>
+      <p:par>
+        <p:cTn id="1" dur="indefinite" restart="never" nodeType="tmRoot"/>
+      </p:par>
+    </p:tnLst>
+  </p:timing>
+</p:sld>
+</file>
+
+<file path=ppt/slides/slide14.xml><?xml version="1.0" encoding="utf-8"?>
+<p:sld xmlns:a="http://schemas.openxmlformats.org/drawingml/2006/main" xmlns:r="http://schemas.openxmlformats.org/officeDocument/2006/relationships" xmlns:p="http://schemas.openxmlformats.org/presentationml/2006/main">
+  <p:cSld>
+    <p:spTree>
+      <p:nvGrpSpPr>
+        <p:cNvPr id="1" name=""/>
+        <p:cNvGrpSpPr/>
+        <p:nvPr/>
+      </p:nvGrpSpPr>
+      <p:grpSpPr>
+        <a:xfrm>
+          <a:off x="0" y="0"/>
+          <a:ext cx="0" cy="0"/>
+          <a:chOff x="0" y="0"/>
+          <a:chExt cx="0" cy="0"/>
+        </a:xfrm>
+      </p:grpSpPr>
+      <p:sp>
+        <p:nvSpPr>
+          <p:cNvPr id="3" name="Date Placeholder 2"/>
+          <p:cNvSpPr>
+            <a:spLocks noGrp="1"/>
+          </p:cNvSpPr>
+          <p:nvPr>
+            <p:ph type="dt" sz="half" idx="10"/>
+          </p:nvPr>
+        </p:nvSpPr>
+        <p:spPr/>
+        <p:txBody>
+          <a:bodyPr/>
+          <a:lstStyle/>
+          <a:p>
+            <a:fld id="{4DBE1F54-EC49-4292-B678-A17F961BB737}" type="datetime4">
+              <a:rPr lang="bg-BG" smtClean="0"/>
+              <a:pPr/>
+              <a:t>17 април 2009 г.</a:t>
+            </a:fld>
+            <a:endParaRPr lang="en-US"/>
+          </a:p>
+        </p:txBody>
+      </p:sp>
+      <p:sp>
+        <p:nvSpPr>
+          <p:cNvPr id="4" name="Slide Number Placeholder 3"/>
+          <p:cNvSpPr>
+            <a:spLocks noGrp="1"/>
+          </p:cNvSpPr>
+          <p:nvPr>
+            <p:ph type="sldNum" sz="quarter" idx="12"/>
+          </p:nvPr>
+        </p:nvSpPr>
+        <p:spPr/>
+        <p:txBody>
+          <a:bodyPr/>
+          <a:lstStyle/>
+          <a:p>
+            <a:fld id="{E9FD1C07-6539-4B1B-9734-EADDB64D7A3F}" type="slidenum">
+              <a:rPr lang="en-US" smtClean="0"/>
+              <a:pPr/>
+              <a:t>14</a:t>
             </a:fld>
             <a:endParaRPr lang="en-US"/>
           </a:p>
@@ -6360,6 +6561,13 @@
   <p:clrMapOvr>
     <a:masterClrMapping/>
   </p:clrMapOvr>
+  <p:timing>
+    <p:tnLst>
+      <p:par>
+        <p:cTn id="1" dur="indefinite" restart="never" nodeType="tmRoot"/>
+      </p:par>
+    </p:tnLst>
+  </p:timing>
 </p:sld>
 </file>
 
@@ -6398,7 +6606,7 @@
             <a:fld id="{A754F394-29D4-487E-9FEA-4187CE7DFCCB}" type="datetime4">
               <a:rPr lang="bg-BG" smtClean="0"/>
               <a:pPr/>
-              <a:t>16 април 2009 г.</a:t>
+              <a:t>17 април 2009 г.</a:t>
             </a:fld>
             <a:endParaRPr lang="en-US"/>
           </a:p>
@@ -6671,7 +6879,7 @@
             <a:fld id="{A754F394-29D4-487E-9FEA-4187CE7DFCCB}" type="datetime4">
               <a:rPr lang="bg-BG" smtClean="0"/>
               <a:pPr/>
-              <a:t>16 април 2009 г.</a:t>
+              <a:t>17 април 2009 г.</a:t>
             </a:fld>
             <a:endParaRPr lang="en-US"/>
           </a:p>
@@ -7104,7 +7312,7 @@
             <a:fld id="{4DBE1F54-EC49-4292-B678-A17F961BB737}" type="datetime4">
               <a:rPr lang="bg-BG" smtClean="0"/>
               <a:pPr/>
-              <a:t>16 април 2009 г.</a:t>
+              <a:t>17 април 2009 г.</a:t>
             </a:fld>
             <a:endParaRPr lang="en-US"/>
           </a:p>
@@ -7281,7 +7489,7 @@
             <a:fld id="{4DBE1F54-EC49-4292-B678-A17F961BB737}" type="datetime4">
               <a:rPr lang="bg-BG" smtClean="0"/>
               <a:pPr/>
-              <a:t>16 април 2009 г.</a:t>
+              <a:t>17 април 2009 г.</a:t>
             </a:fld>
             <a:endParaRPr lang="en-US"/>
           </a:p>
@@ -7382,7 +7590,9 @@
         </p:nvSpPr>
         <p:spPr/>
         <p:txBody>
-          <a:bodyPr/>
+          <a:bodyPr>
+            <a:normAutofit/>
+          </a:bodyPr>
           <a:lstStyle/>
           <a:p>
             <a:r>
@@ -7408,31 +7618,369 @@
             <a:pPr lvl="2"/>
             <a:r>
               <a:rPr lang="bg-BG" dirty="0" smtClean="0"/>
-              <a:t>вместо как точно да стане</a:t>
-            </a:r>
-          </a:p>
-          <a:p>
+              <a:t>вместо как точно да </a:t>
+            </a:r>
             <a:r>
               <a:rPr lang="bg-BG" dirty="0" smtClean="0"/>
-              <a:t>Без странични ефекти</a:t>
-            </a:r>
-          </a:p>
-          <a:p>
-            <a:pPr lvl="1"/>
-            <a:r>
-              <a:rPr lang="bg-BG" dirty="0" smtClean="0"/>
-              <a:t>еднакъв резултат при еднакви параметри;</a:t>
-            </a:r>
-          </a:p>
-          <a:p>
-            <a:pPr lvl="1"/>
-            <a:r>
-              <a:rPr lang="bg-BG" dirty="0" smtClean="0"/>
-              <a:t>без споделена “памет”.</a:t>
-            </a:r>
-          </a:p>
-          <a:p>
-            <a:endParaRPr lang="en-US" dirty="0"/>
+              <a:t>стане</a:t>
+            </a:r>
+            <a:endParaRPr lang="bg-BG" sz="2400" b="0" dirty="0" smtClean="0">
+              <a:solidFill>
+                <a:schemeClr val="tx2">
+                  <a:lumMod val="60000"/>
+                  <a:lumOff val="40000"/>
+                </a:schemeClr>
+              </a:solidFill>
+              <a:latin typeface="Consolas" pitchFamily="49" charset="0"/>
+            </a:endParaRPr>
+          </a:p>
+          <a:p>
+            <a:pPr>
+              <a:buNone/>
+            </a:pPr>
+            <a:r>
+              <a:rPr lang="en-US" sz="2400" b="0" dirty="0" err="1" smtClean="0">
+                <a:solidFill>
+                  <a:schemeClr val="tx2">
+                    <a:lumMod val="60000"/>
+                    <a:lumOff val="40000"/>
+                  </a:schemeClr>
+                </a:solidFill>
+                <a:latin typeface="Consolas" pitchFamily="49" charset="0"/>
+              </a:rPr>
+              <a:t>var</a:t>
+            </a:r>
+            <a:r>
+              <a:rPr lang="en-US" sz="2400" b="0" dirty="0" smtClean="0">
+                <a:solidFill>
+                  <a:schemeClr val="tx2">
+                    <a:lumMod val="60000"/>
+                    <a:lumOff val="40000"/>
+                  </a:schemeClr>
+                </a:solidFill>
+                <a:latin typeface="Consolas" pitchFamily="49" charset="0"/>
+              </a:rPr>
+              <a:t> </a:t>
+            </a:r>
+            <a:r>
+              <a:rPr lang="en-US" sz="2400" b="0" dirty="0" smtClean="0">
+                <a:solidFill>
+                  <a:schemeClr val="tx2">
+                    <a:lumMod val="60000"/>
+                    <a:lumOff val="40000"/>
+                  </a:schemeClr>
+                </a:solidFill>
+                <a:latin typeface="Consolas" pitchFamily="49" charset="0"/>
+              </a:rPr>
+              <a:t>from = new List&lt;</a:t>
+            </a:r>
+            <a:r>
+              <a:rPr lang="en-US" sz="2400" b="0" dirty="0" err="1" smtClean="0">
+                <a:solidFill>
+                  <a:schemeClr val="tx2">
+                    <a:lumMod val="60000"/>
+                    <a:lumOff val="40000"/>
+                  </a:schemeClr>
+                </a:solidFill>
+                <a:latin typeface="Consolas" pitchFamily="49" charset="0"/>
+              </a:rPr>
+              <a:t>int</a:t>
+            </a:r>
+            <a:r>
+              <a:rPr lang="en-US" sz="2400" b="0" dirty="0" smtClean="0">
+                <a:solidFill>
+                  <a:schemeClr val="tx2">
+                    <a:lumMod val="60000"/>
+                    <a:lumOff val="40000"/>
+                  </a:schemeClr>
+                </a:solidFill>
+                <a:latin typeface="Consolas" pitchFamily="49" charset="0"/>
+              </a:rPr>
+              <a:t>&gt;() { 1, 2, 3 </a:t>
+            </a:r>
+            <a:r>
+              <a:rPr lang="en-US" sz="2400" b="0" dirty="0" smtClean="0">
+                <a:solidFill>
+                  <a:schemeClr val="tx2">
+                    <a:lumMod val="60000"/>
+                    <a:lumOff val="40000"/>
+                  </a:schemeClr>
+                </a:solidFill>
+                <a:latin typeface="Consolas" pitchFamily="49" charset="0"/>
+              </a:rPr>
+              <a:t>};</a:t>
+            </a:r>
+            <a:endParaRPr lang="bg-BG" sz="2400" b="0" dirty="0" smtClean="0">
+              <a:solidFill>
+                <a:schemeClr val="tx2">
+                  <a:lumMod val="60000"/>
+                  <a:lumOff val="40000"/>
+                </a:schemeClr>
+              </a:solidFill>
+              <a:latin typeface="Consolas" pitchFamily="49" charset="0"/>
+            </a:endParaRPr>
+          </a:p>
+          <a:p>
+            <a:pPr>
+              <a:buNone/>
+            </a:pPr>
+            <a:r>
+              <a:rPr lang="en-US" sz="2400" b="0" dirty="0" err="1" smtClean="0">
+                <a:solidFill>
+                  <a:schemeClr val="tx2">
+                    <a:lumMod val="60000"/>
+                    <a:lumOff val="40000"/>
+                  </a:schemeClr>
+                </a:solidFill>
+                <a:latin typeface="Consolas" pitchFamily="49" charset="0"/>
+              </a:rPr>
+              <a:t>var</a:t>
+            </a:r>
+            <a:r>
+              <a:rPr lang="en-US" sz="2400" b="0" dirty="0" smtClean="0">
+                <a:solidFill>
+                  <a:schemeClr val="tx2">
+                    <a:lumMod val="60000"/>
+                    <a:lumOff val="40000"/>
+                  </a:schemeClr>
+                </a:solidFill>
+                <a:latin typeface="Consolas" pitchFamily="49" charset="0"/>
+              </a:rPr>
+              <a:t> </a:t>
+            </a:r>
+            <a:r>
+              <a:rPr lang="en-US" sz="2400" b="0" dirty="0" smtClean="0">
+                <a:solidFill>
+                  <a:schemeClr val="tx2">
+                    <a:lumMod val="60000"/>
+                    <a:lumOff val="40000"/>
+                  </a:schemeClr>
+                </a:solidFill>
+                <a:latin typeface="Consolas" pitchFamily="49" charset="0"/>
+              </a:rPr>
+              <a:t>to = new List&lt;</a:t>
+            </a:r>
+            <a:r>
+              <a:rPr lang="en-US" sz="2400" b="0" dirty="0" err="1" smtClean="0">
+                <a:solidFill>
+                  <a:schemeClr val="tx2">
+                    <a:lumMod val="60000"/>
+                    <a:lumOff val="40000"/>
+                  </a:schemeClr>
+                </a:solidFill>
+                <a:latin typeface="Consolas" pitchFamily="49" charset="0"/>
+              </a:rPr>
+              <a:t>int</a:t>
+            </a:r>
+            <a:r>
+              <a:rPr lang="en-US" sz="2400" b="0" dirty="0" smtClean="0">
+                <a:solidFill>
+                  <a:schemeClr val="tx2">
+                    <a:lumMod val="60000"/>
+                    <a:lumOff val="40000"/>
+                  </a:schemeClr>
+                </a:solidFill>
+                <a:latin typeface="Consolas" pitchFamily="49" charset="0"/>
+              </a:rPr>
+              <a:t>&gt;();</a:t>
+            </a:r>
+            <a:endParaRPr lang="bg-BG" sz="2400" b="0" dirty="0" smtClean="0">
+              <a:solidFill>
+                <a:schemeClr val="tx2">
+                  <a:lumMod val="60000"/>
+                  <a:lumOff val="40000"/>
+                </a:schemeClr>
+              </a:solidFill>
+              <a:latin typeface="Consolas" pitchFamily="49" charset="0"/>
+            </a:endParaRPr>
+          </a:p>
+          <a:p>
+            <a:pPr>
+              <a:buNone/>
+            </a:pPr>
+            <a:r>
+              <a:rPr lang="nn-NO" sz="2400" b="0" dirty="0" smtClean="0">
+                <a:solidFill>
+                  <a:schemeClr val="tx2">
+                    <a:lumMod val="60000"/>
+                    <a:lumOff val="40000"/>
+                  </a:schemeClr>
+                </a:solidFill>
+                <a:latin typeface="Consolas" pitchFamily="49" charset="0"/>
+              </a:rPr>
+              <a:t>for </a:t>
+            </a:r>
+            <a:r>
+              <a:rPr lang="nn-NO" sz="2400" b="0" dirty="0" smtClean="0">
+                <a:solidFill>
+                  <a:schemeClr val="tx2">
+                    <a:lumMod val="60000"/>
+                    <a:lumOff val="40000"/>
+                  </a:schemeClr>
+                </a:solidFill>
+                <a:latin typeface="Consolas" pitchFamily="49" charset="0"/>
+              </a:rPr>
+              <a:t>(int i = 0; i &lt; from.Count; i</a:t>
+            </a:r>
+            <a:r>
+              <a:rPr lang="nn-NO" sz="2400" b="0" dirty="0" smtClean="0">
+                <a:solidFill>
+                  <a:schemeClr val="tx2">
+                    <a:lumMod val="60000"/>
+                    <a:lumOff val="40000"/>
+                  </a:schemeClr>
+                </a:solidFill>
+                <a:latin typeface="Consolas" pitchFamily="49" charset="0"/>
+              </a:rPr>
+              <a:t>++)</a:t>
+            </a:r>
+            <a:endParaRPr lang="bg-BG" sz="2400" b="0" dirty="0" smtClean="0">
+              <a:solidFill>
+                <a:schemeClr val="tx2">
+                  <a:lumMod val="60000"/>
+                  <a:lumOff val="40000"/>
+                </a:schemeClr>
+              </a:solidFill>
+              <a:latin typeface="Consolas" pitchFamily="49" charset="0"/>
+            </a:endParaRPr>
+          </a:p>
+          <a:p>
+            <a:pPr>
+              <a:buNone/>
+            </a:pPr>
+            <a:r>
+              <a:rPr lang="en-US" sz="2400" b="0" dirty="0" smtClean="0">
+                <a:solidFill>
+                  <a:schemeClr val="tx2">
+                    <a:lumMod val="60000"/>
+                    <a:lumOff val="40000"/>
+                  </a:schemeClr>
+                </a:solidFill>
+                <a:latin typeface="Consolas" pitchFamily="49" charset="0"/>
+              </a:rPr>
+              <a:t>{</a:t>
+            </a:r>
+            <a:endParaRPr lang="bg-BG" sz="2400" b="0" dirty="0" smtClean="0">
+              <a:solidFill>
+                <a:schemeClr val="tx2">
+                  <a:lumMod val="60000"/>
+                  <a:lumOff val="40000"/>
+                </a:schemeClr>
+              </a:solidFill>
+              <a:latin typeface="Consolas" pitchFamily="49" charset="0"/>
+            </a:endParaRPr>
+          </a:p>
+          <a:p>
+            <a:pPr>
+              <a:buNone/>
+            </a:pPr>
+            <a:r>
+              <a:rPr lang="en-US" sz="2400" b="0" dirty="0" smtClean="0">
+                <a:solidFill>
+                  <a:schemeClr val="tx2">
+                    <a:lumMod val="60000"/>
+                    <a:lumOff val="40000"/>
+                  </a:schemeClr>
+                </a:solidFill>
+                <a:latin typeface="Consolas" pitchFamily="49" charset="0"/>
+              </a:rPr>
+              <a:t>    </a:t>
+            </a:r>
+            <a:r>
+              <a:rPr lang="en-US" sz="2400" b="0" dirty="0" err="1" smtClean="0">
+                <a:solidFill>
+                  <a:schemeClr val="tx2">
+                    <a:lumMod val="60000"/>
+                    <a:lumOff val="40000"/>
+                  </a:schemeClr>
+                </a:solidFill>
+                <a:latin typeface="Consolas" pitchFamily="49" charset="0"/>
+              </a:rPr>
+              <a:t>to.Add</a:t>
+            </a:r>
+            <a:r>
+              <a:rPr lang="en-US" sz="2400" b="0" dirty="0" smtClean="0">
+                <a:solidFill>
+                  <a:schemeClr val="tx2">
+                    <a:lumMod val="60000"/>
+                    <a:lumOff val="40000"/>
+                  </a:schemeClr>
+                </a:solidFill>
+                <a:latin typeface="Consolas" pitchFamily="49" charset="0"/>
+              </a:rPr>
+              <a:t>(from[</a:t>
+            </a:r>
+            <a:r>
+              <a:rPr lang="en-US" sz="2400" b="0" dirty="0" err="1" smtClean="0">
+                <a:solidFill>
+                  <a:schemeClr val="tx2">
+                    <a:lumMod val="60000"/>
+                    <a:lumOff val="40000"/>
+                  </a:schemeClr>
+                </a:solidFill>
+                <a:latin typeface="Consolas" pitchFamily="49" charset="0"/>
+              </a:rPr>
+              <a:t>i</a:t>
+            </a:r>
+            <a:r>
+              <a:rPr lang="en-US" sz="2400" b="0" dirty="0" smtClean="0">
+                <a:solidFill>
+                  <a:schemeClr val="tx2">
+                    <a:lumMod val="60000"/>
+                    <a:lumOff val="40000"/>
+                  </a:schemeClr>
+                </a:solidFill>
+                <a:latin typeface="Consolas" pitchFamily="49" charset="0"/>
+              </a:rPr>
+              <a:t>] * 2</a:t>
+            </a:r>
+            <a:r>
+              <a:rPr lang="en-US" sz="2400" b="0" dirty="0" smtClean="0">
+                <a:solidFill>
+                  <a:schemeClr val="tx2">
+                    <a:lumMod val="60000"/>
+                    <a:lumOff val="40000"/>
+                  </a:schemeClr>
+                </a:solidFill>
+                <a:latin typeface="Consolas" pitchFamily="49" charset="0"/>
+              </a:rPr>
+              <a:t>);</a:t>
+            </a:r>
+            <a:endParaRPr lang="bg-BG" sz="2400" b="0" dirty="0" smtClean="0">
+              <a:solidFill>
+                <a:schemeClr val="tx2">
+                  <a:lumMod val="60000"/>
+                  <a:lumOff val="40000"/>
+                </a:schemeClr>
+              </a:solidFill>
+              <a:latin typeface="Consolas" pitchFamily="49" charset="0"/>
+            </a:endParaRPr>
+          </a:p>
+          <a:p>
+            <a:pPr>
+              <a:buNone/>
+            </a:pPr>
+            <a:r>
+              <a:rPr lang="en-US" sz="2400" b="0" dirty="0" smtClean="0">
+                <a:solidFill>
+                  <a:schemeClr val="tx2">
+                    <a:lumMod val="60000"/>
+                    <a:lumOff val="40000"/>
+                  </a:schemeClr>
+                </a:solidFill>
+                <a:latin typeface="Consolas" pitchFamily="49" charset="0"/>
+              </a:rPr>
+              <a:t>}</a:t>
+            </a:r>
+            <a:endParaRPr lang="en-US" sz="2400" b="0" dirty="0">
+              <a:solidFill>
+                <a:schemeClr val="tx2">
+                  <a:lumMod val="60000"/>
+                  <a:lumOff val="40000"/>
+                </a:schemeClr>
+              </a:solidFill>
+              <a:latin typeface="Consolas" pitchFamily="49" charset="0"/>
+            </a:endParaRPr>
           </a:p>
         </p:txBody>
       </p:sp>
@@ -7454,7 +8002,7 @@
             <a:fld id="{4DBE1F54-EC49-4292-B678-A17F961BB737}" type="datetime4">
               <a:rPr lang="bg-BG" smtClean="0"/>
               <a:pPr/>
-              <a:t>16 април 2009 г.</a:t>
+              <a:t>17 април 2009 г.</a:t>
             </a:fld>
             <a:endParaRPr lang="en-US"/>
           </a:p>
@@ -7515,283 +8063,7 @@
   <p:timing>
     <p:tnLst>
       <p:par>
-        <p:cTn id="1" dur="indefinite" restart="never" nodeType="tmRoot">
-          <p:childTnLst>
-            <p:seq concurrent="1" nextAc="seek">
-              <p:cTn id="2" dur="indefinite" nodeType="mainSeq">
-                <p:childTnLst>
-                  <p:par>
-                    <p:cTn id="3" fill="hold">
-                      <p:stCondLst>
-                        <p:cond delay="indefinite"/>
-                      </p:stCondLst>
-                      <p:childTnLst>
-                        <p:par>
-                          <p:cTn id="4" fill="hold">
-                            <p:stCondLst>
-                              <p:cond delay="0"/>
-                            </p:stCondLst>
-                            <p:childTnLst>
-                              <p:par>
-                                <p:cTn id="5" presetID="1" presetClass="entr" presetSubtype="0" fill="hold" nodeType="clickEffect">
-                                  <p:stCondLst>
-                                    <p:cond delay="0"/>
-                                  </p:stCondLst>
-                                  <p:childTnLst>
-                                    <p:set>
-                                      <p:cBhvr>
-                                        <p:cTn id="6" dur="1" fill="hold">
-                                          <p:stCondLst>
-                                            <p:cond delay="0"/>
-                                          </p:stCondLst>
-                                        </p:cTn>
-                                        <p:tgtEl>
-                                          <p:spTgt spid="2">
-                                            <p:txEl>
-                                              <p:pRg st="0" end="0"/>
-                                            </p:txEl>
-                                          </p:spTgt>
-                                        </p:tgtEl>
-                                        <p:attrNameLst>
-                                          <p:attrName>style.visibility</p:attrName>
-                                        </p:attrNameLst>
-                                      </p:cBhvr>
-                                      <p:to>
-                                        <p:strVal val="visible"/>
-                                      </p:to>
-                                    </p:set>
-                                  </p:childTnLst>
-                                </p:cTn>
-                              </p:par>
-                              <p:par>
-                                <p:cTn id="7" presetID="1" presetClass="entr" presetSubtype="0" fill="hold" nodeType="withEffect">
-                                  <p:stCondLst>
-                                    <p:cond delay="0"/>
-                                  </p:stCondLst>
-                                  <p:childTnLst>
-                                    <p:set>
-                                      <p:cBhvr>
-                                        <p:cTn id="8" dur="1" fill="hold">
-                                          <p:stCondLst>
-                                            <p:cond delay="0"/>
-                                          </p:stCondLst>
-                                        </p:cTn>
-                                        <p:tgtEl>
-                                          <p:spTgt spid="2">
-                                            <p:txEl>
-                                              <p:pRg st="1" end="1"/>
-                                            </p:txEl>
-                                          </p:spTgt>
-                                        </p:tgtEl>
-                                        <p:attrNameLst>
-                                          <p:attrName>style.visibility</p:attrName>
-                                        </p:attrNameLst>
-                                      </p:cBhvr>
-                                      <p:to>
-                                        <p:strVal val="visible"/>
-                                      </p:to>
-                                    </p:set>
-                                  </p:childTnLst>
-                                </p:cTn>
-                              </p:par>
-                              <p:par>
-                                <p:cTn id="9" presetID="1" presetClass="entr" presetSubtype="0" fill="hold" nodeType="withEffect">
-                                  <p:stCondLst>
-                                    <p:cond delay="0"/>
-                                  </p:stCondLst>
-                                  <p:childTnLst>
-                                    <p:set>
-                                      <p:cBhvr>
-                                        <p:cTn id="10" dur="1" fill="hold">
-                                          <p:stCondLst>
-                                            <p:cond delay="0"/>
-                                          </p:stCondLst>
-                                        </p:cTn>
-                                        <p:tgtEl>
-                                          <p:spTgt spid="2">
-                                            <p:txEl>
-                                              <p:pRg st="2" end="2"/>
-                                            </p:txEl>
-                                          </p:spTgt>
-                                        </p:tgtEl>
-                                        <p:attrNameLst>
-                                          <p:attrName>style.visibility</p:attrName>
-                                        </p:attrNameLst>
-                                      </p:cBhvr>
-                                      <p:to>
-                                        <p:strVal val="visible"/>
-                                      </p:to>
-                                    </p:set>
-                                  </p:childTnLst>
-                                </p:cTn>
-                              </p:par>
-                              <p:par>
-                                <p:cTn id="11" presetID="1" presetClass="entr" presetSubtype="0" fill="hold" nodeType="withEffect">
-                                  <p:stCondLst>
-                                    <p:cond delay="0"/>
-                                  </p:stCondLst>
-                                  <p:childTnLst>
-                                    <p:set>
-                                      <p:cBhvr>
-                                        <p:cTn id="12" dur="1" fill="hold">
-                                          <p:stCondLst>
-                                            <p:cond delay="0"/>
-                                          </p:stCondLst>
-                                        </p:cTn>
-                                        <p:tgtEl>
-                                          <p:spTgt spid="2">
-                                            <p:txEl>
-                                              <p:pRg st="3" end="3"/>
-                                            </p:txEl>
-                                          </p:spTgt>
-                                        </p:tgtEl>
-                                        <p:attrNameLst>
-                                          <p:attrName>style.visibility</p:attrName>
-                                        </p:attrNameLst>
-                                      </p:cBhvr>
-                                      <p:to>
-                                        <p:strVal val="visible"/>
-                                      </p:to>
-                                    </p:set>
-                                  </p:childTnLst>
-                                </p:cTn>
-                              </p:par>
-                            </p:childTnLst>
-                          </p:cTn>
-                        </p:par>
-                      </p:childTnLst>
-                    </p:cTn>
-                  </p:par>
-                  <p:par>
-                    <p:cTn id="13" fill="hold">
-                      <p:stCondLst>
-                        <p:cond delay="indefinite"/>
-                      </p:stCondLst>
-                      <p:childTnLst>
-                        <p:par>
-                          <p:cTn id="14" fill="hold">
-                            <p:stCondLst>
-                              <p:cond delay="0"/>
-                            </p:stCondLst>
-                            <p:childTnLst>
-                              <p:par>
-                                <p:cTn id="15" presetID="1" presetClass="entr" presetSubtype="0" fill="hold" nodeType="clickEffect">
-                                  <p:stCondLst>
-                                    <p:cond delay="0"/>
-                                  </p:stCondLst>
-                                  <p:childTnLst>
-                                    <p:set>
-                                      <p:cBhvr>
-                                        <p:cTn id="16" dur="1" fill="hold">
-                                          <p:stCondLst>
-                                            <p:cond delay="0"/>
-                                          </p:stCondLst>
-                                        </p:cTn>
-                                        <p:tgtEl>
-                                          <p:spTgt spid="2">
-                                            <p:txEl>
-                                              <p:pRg st="4" end="4"/>
-                                            </p:txEl>
-                                          </p:spTgt>
-                                        </p:tgtEl>
-                                        <p:attrNameLst>
-                                          <p:attrName>style.visibility</p:attrName>
-                                        </p:attrNameLst>
-                                      </p:cBhvr>
-                                      <p:to>
-                                        <p:strVal val="visible"/>
-                                      </p:to>
-                                    </p:set>
-                                  </p:childTnLst>
-                                </p:cTn>
-                              </p:par>
-                              <p:par>
-                                <p:cTn id="17" presetID="1" presetClass="entr" presetSubtype="0" fill="hold" nodeType="withEffect">
-                                  <p:stCondLst>
-                                    <p:cond delay="0"/>
-                                  </p:stCondLst>
-                                  <p:childTnLst>
-                                    <p:set>
-                                      <p:cBhvr>
-                                        <p:cTn id="18" dur="1" fill="hold">
-                                          <p:stCondLst>
-                                            <p:cond delay="0"/>
-                                          </p:stCondLst>
-                                        </p:cTn>
-                                        <p:tgtEl>
-                                          <p:spTgt spid="2">
-                                            <p:txEl>
-                                              <p:pRg st="5" end="5"/>
-                                            </p:txEl>
-                                          </p:spTgt>
-                                        </p:tgtEl>
-                                        <p:attrNameLst>
-                                          <p:attrName>style.visibility</p:attrName>
-                                        </p:attrNameLst>
-                                      </p:cBhvr>
-                                      <p:to>
-                                        <p:strVal val="visible"/>
-                                      </p:to>
-                                    </p:set>
-                                  </p:childTnLst>
-                                </p:cTn>
-                              </p:par>
-                              <p:par>
-                                <p:cTn id="19" presetID="1" presetClass="entr" presetSubtype="0" fill="hold" nodeType="withEffect">
-                                  <p:stCondLst>
-                                    <p:cond delay="0"/>
-                                  </p:stCondLst>
-                                  <p:childTnLst>
-                                    <p:set>
-                                      <p:cBhvr>
-                                        <p:cTn id="20" dur="1" fill="hold">
-                                          <p:stCondLst>
-                                            <p:cond delay="0"/>
-                                          </p:stCondLst>
-                                        </p:cTn>
-                                        <p:tgtEl>
-                                          <p:spTgt spid="2">
-                                            <p:txEl>
-                                              <p:pRg st="6" end="6"/>
-                                            </p:txEl>
-                                          </p:spTgt>
-                                        </p:tgtEl>
-                                        <p:attrNameLst>
-                                          <p:attrName>style.visibility</p:attrName>
-                                        </p:attrNameLst>
-                                      </p:cBhvr>
-                                      <p:to>
-                                        <p:strVal val="visible"/>
-                                      </p:to>
-                                    </p:set>
-                                  </p:childTnLst>
-                                </p:cTn>
-                              </p:par>
-                            </p:childTnLst>
-                          </p:cTn>
-                        </p:par>
-                      </p:childTnLst>
-                    </p:cTn>
-                  </p:par>
-                </p:childTnLst>
-              </p:cTn>
-              <p:prevCondLst>
-                <p:cond evt="onPrev" delay="0">
-                  <p:tgtEl>
-                    <p:sldTgt/>
-                  </p:tgtEl>
-                </p:cond>
-              </p:prevCondLst>
-              <p:nextCondLst>
-                <p:cond evt="onNext" delay="0">
-                  <p:tgtEl>
-                    <p:sldTgt/>
-                  </p:tgtEl>
-                </p:cond>
-              </p:nextCondLst>
-            </p:seq>
-          </p:childTnLst>
-        </p:cTn>
+        <p:cTn id="1" dur="indefinite" restart="never" nodeType="tmRoot"/>
       </p:par>
     </p:tnLst>
   </p:timing>
@@ -7832,65 +8104,47 @@
           <a:p>
             <a:r>
               <a:rPr lang="bg-BG" dirty="0" smtClean="0"/>
-              <a:t>Мутиралите данни са източник на проблеми</a:t>
+              <a:t>Без странични ефекти</a:t>
             </a:r>
           </a:p>
           <a:p>
             <a:pPr lvl="1"/>
             <a:r>
               <a:rPr lang="bg-BG" dirty="0" smtClean="0"/>
-              <a:t>глупави бъгове</a:t>
+              <a:t>еднакъв резултат при еднакви параметри</a:t>
+            </a:r>
+            <a:r>
+              <a:rPr lang="bg-BG" dirty="0" smtClean="0"/>
+              <a:t>;</a:t>
             </a:r>
           </a:p>
           <a:p>
             <a:pPr lvl="1"/>
             <a:r>
               <a:rPr lang="bg-BG" dirty="0" smtClean="0"/>
-              <a:t>дупки в сигурността</a:t>
-            </a:r>
+              <a:t>трябва да можем </a:t>
+            </a:r>
+            <a:r>
+              <a:rPr lang="bg-BG" dirty="0" smtClean="0"/>
+              <a:t>да заменим функцията с таблица от параметър -&gt; </a:t>
+            </a:r>
+            <a:r>
+              <a:rPr lang="bg-BG" dirty="0" smtClean="0"/>
+              <a:t>резултат</a:t>
+            </a:r>
+            <a:endParaRPr lang="bg-BG" dirty="0" smtClean="0"/>
           </a:p>
           <a:p>
             <a:pPr lvl="1"/>
             <a:r>
               <a:rPr lang="bg-BG" dirty="0" smtClean="0"/>
-              <a:t>трудна синхронизация: </a:t>
-            </a:r>
-            <a:r>
-              <a:rPr lang="en-US" dirty="0" smtClean="0"/>
-              <a:t>deadlocks</a:t>
+              <a:t>без споделена “памет</a:t>
             </a:r>
             <a:r>
               <a:rPr lang="bg-BG" dirty="0" smtClean="0"/>
-              <a:t> и т.н.</a:t>
-            </a:r>
-          </a:p>
-          <a:p>
-            <a:r>
-              <a:rPr lang="bg-BG" dirty="0" smtClean="0"/>
-              <a:t>Решението: </a:t>
-            </a:r>
-            <a:r>
-              <a:rPr lang="en-US" dirty="0" smtClean="0"/>
-              <a:t>immutable data</a:t>
-            </a:r>
-          </a:p>
-          <a:p>
-            <a:pPr lvl="1"/>
-            <a:r>
-              <a:rPr lang="bg-BG" dirty="0" smtClean="0"/>
-              <a:t>нищо не може да се променя след като е създадено</a:t>
-            </a:r>
-          </a:p>
-          <a:p>
-            <a:pPr lvl="1"/>
-            <a:r>
-              <a:rPr lang="bg-BG" smtClean="0"/>
-              <a:t>много</a:t>
-            </a:r>
-            <a:r>
-              <a:rPr lang="bg-BG" dirty="0" smtClean="0"/>
-              <a:t>, много различен стил на програмиране</a:t>
-            </a:r>
+              <a:t>” и действия върху околния свят.</a:t>
+            </a:r>
+            <a:endParaRPr lang="bg-BG" dirty="0" smtClean="0"/>
           </a:p>
         </p:txBody>
       </p:sp>
@@ -7912,7 +8166,7 @@
             <a:fld id="{4DBE1F54-EC49-4292-B678-A17F961BB737}" type="datetime4">
               <a:rPr lang="bg-BG" smtClean="0"/>
               <a:pPr/>
-              <a:t>16 април 2009 г.</a:t>
+              <a:t>17 април 2009 г.</a:t>
             </a:fld>
             <a:endParaRPr lang="en-US"/>
           </a:p>
@@ -7959,7 +8213,7 @@
           <a:p>
             <a:r>
               <a:rPr lang="bg-BG" dirty="0" smtClean="0"/>
-              <a:t>Злите мутации</a:t>
+              <a:t>Функционалното програмиране</a:t>
             </a:r>
             <a:endParaRPr lang="en-US" dirty="0"/>
           </a:p>
@@ -7970,6 +8224,13 @@
   <p:clrMapOvr>
     <a:masterClrMapping/>
   </p:clrMapOvr>
+  <p:timing>
+    <p:tnLst>
+      <p:par>
+        <p:cTn id="1" dur="indefinite" restart="never" nodeType="tmRoot"/>
+      </p:par>
+    </p:tnLst>
+  </p:timing>
 </p:sld>
 </file>
 
@@ -8007,61 +8268,64 @@
           <a:p>
             <a:r>
               <a:rPr lang="bg-BG" dirty="0" smtClean="0"/>
-              <a:t>Декларации с </a:t>
+              <a:t>Мутиралите данни са източник на проблеми</a:t>
+            </a:r>
+          </a:p>
+          <a:p>
+            <a:pPr lvl="1"/>
+            <a:r>
+              <a:rPr lang="bg-BG" dirty="0" smtClean="0"/>
+              <a:t>глупави бъгове</a:t>
+            </a:r>
+          </a:p>
+          <a:p>
+            <a:pPr lvl="1"/>
+            <a:r>
+              <a:rPr lang="bg-BG" dirty="0" smtClean="0"/>
+              <a:t>дупки в сигурността</a:t>
+            </a:r>
+          </a:p>
+          <a:p>
+            <a:pPr lvl="1"/>
+            <a:r>
+              <a:rPr lang="bg-BG" dirty="0" smtClean="0"/>
+              <a:t>трудна синхронизация: </a:t>
             </a:r>
             <a:r>
               <a:rPr lang="en-US" dirty="0" smtClean="0"/>
-              <a:t>let</a:t>
-            </a:r>
-            <a:endParaRPr lang="bg-BG" dirty="0" smtClean="0"/>
-          </a:p>
-          <a:p>
+              <a:t>deadlocks</a:t>
+            </a:r>
             <a:r>
               <a:rPr lang="bg-BG" dirty="0" smtClean="0"/>
-              <a:t>Функции</a:t>
-            </a:r>
-            <a:endParaRPr lang="en-US" dirty="0" smtClean="0"/>
+              <a:t> и т.н.</a:t>
+            </a:r>
           </a:p>
           <a:p>
             <a:r>
               <a:rPr lang="bg-BG" dirty="0" smtClean="0"/>
-              <a:t>Чисти и мутирали данни</a:t>
-            </a:r>
-          </a:p>
-          <a:p>
+              <a:t>Решението: </a:t>
+            </a:r>
+            <a:r>
+              <a:rPr lang="en-US" dirty="0" smtClean="0"/>
+              <a:t>immutable data</a:t>
+            </a:r>
+          </a:p>
+          <a:p>
+            <a:pPr lvl="1"/>
             <a:r>
               <a:rPr lang="bg-BG" dirty="0" smtClean="0"/>
-              <a:t>Примитиви:</a:t>
+              <a:t>нищо не може да се променя след като е създадено</a:t>
             </a:r>
           </a:p>
           <a:p>
             <a:pPr lvl="1"/>
             <a:r>
-              <a:rPr lang="en-US" dirty="0" err="1" smtClean="0"/>
-              <a:t>Tuples</a:t>
-            </a:r>
-            <a:endParaRPr lang="en-US" dirty="0" smtClean="0"/>
-          </a:p>
-          <a:p>
-            <a:pPr lvl="1"/>
+              <a:rPr lang="bg-BG" smtClean="0"/>
+              <a:t>много</a:t>
+            </a:r>
             <a:r>
               <a:rPr lang="bg-BG" dirty="0" smtClean="0"/>
-              <a:t>Масиви и списъци</a:t>
-            </a:r>
-          </a:p>
-          <a:p>
-            <a:pPr lvl="1"/>
-            <a:r>
-              <a:rPr lang="bg-BG" dirty="0" smtClean="0"/>
-              <a:t>.</a:t>
-            </a:r>
-            <a:r>
-              <a:rPr lang="en-US" dirty="0" smtClean="0"/>
-              <a:t>NET </a:t>
-            </a:r>
-            <a:r>
-              <a:rPr lang="bg-BG" dirty="0" smtClean="0"/>
-              <a:t>Колекции</a:t>
+              <a:t>, много различен стил на програмиране</a:t>
             </a:r>
           </a:p>
         </p:txBody>
@@ -8084,7 +8348,7 @@
             <a:fld id="{4DBE1F54-EC49-4292-B678-A17F961BB737}" type="datetime4">
               <a:rPr lang="bg-BG" smtClean="0"/>
               <a:pPr/>
-              <a:t>16 април 2009 г.</a:t>
+              <a:t>17 април 2009 г.</a:t>
             </a:fld>
             <a:endParaRPr lang="en-US"/>
           </a:p>
@@ -8131,7 +8395,7 @@
           <a:p>
             <a:r>
               <a:rPr lang="bg-BG" dirty="0" smtClean="0"/>
-              <a:t>Демо 1 – Основи</a:t>
+              <a:t>Злите мутации</a:t>
             </a:r>
             <a:endParaRPr lang="en-US" dirty="0"/>
           </a:p>
@@ -8142,6 +8406,13 @@
   <p:clrMapOvr>
     <a:masterClrMapping/>
   </p:clrMapOvr>
+  <p:timing>
+    <p:tnLst>
+      <p:par>
+        <p:cTn id="1" dur="indefinite" restart="never" nodeType="tmRoot"/>
+      </p:par>
+    </p:tnLst>
+  </p:timing>
 </p:sld>
 </file>
 
@@ -8179,62 +8450,62 @@
           <a:p>
             <a:r>
               <a:rPr lang="bg-BG" dirty="0" smtClean="0"/>
-              <a:t>Всички функции имат един параметър!</a:t>
+              <a:t>Декларации с </a:t>
+            </a:r>
+            <a:r>
+              <a:rPr lang="en-US" dirty="0" smtClean="0"/>
+              <a:t>let</a:t>
+            </a:r>
+            <a:endParaRPr lang="bg-BG" dirty="0" smtClean="0"/>
+          </a:p>
+          <a:p>
+            <a:r>
+              <a:rPr lang="bg-BG" dirty="0" smtClean="0"/>
+              <a:t>Функции</a:t>
+            </a:r>
+            <a:endParaRPr lang="en-US" dirty="0" smtClean="0"/>
+          </a:p>
+          <a:p>
+            <a:r>
+              <a:rPr lang="bg-BG" dirty="0" smtClean="0"/>
+              <a:t>Чисти и мутирали данни</a:t>
+            </a:r>
+          </a:p>
+          <a:p>
+            <a:r>
+              <a:rPr lang="bg-BG" dirty="0" smtClean="0"/>
+              <a:t>Примитиви:</a:t>
             </a:r>
           </a:p>
           <a:p>
             <a:pPr lvl="1"/>
             <a:r>
+              <a:rPr lang="en-US" dirty="0" err="1" smtClean="0"/>
+              <a:t>Tuples</a:t>
+            </a:r>
+            <a:endParaRPr lang="en-US" dirty="0" smtClean="0"/>
+          </a:p>
+          <a:p>
+            <a:pPr lvl="1"/>
+            <a:r>
+              <a:rPr lang="bg-BG" dirty="0" smtClean="0"/>
+              <a:t>Масиви и списъци</a:t>
+            </a:r>
+          </a:p>
+          <a:p>
+            <a:pPr lvl="1"/>
+            <a:r>
+              <a:rPr lang="bg-BG" dirty="0" smtClean="0"/>
+              <a:t>.</a:t>
+            </a:r>
+            <a:r>
               <a:rPr lang="en-US" dirty="0" smtClean="0"/>
-              <a:t>Currying</a:t>
-            </a:r>
-          </a:p>
-          <a:p>
+              <a:t>NET </a:t>
+            </a:r>
             <a:r>
               <a:rPr lang="bg-BG" dirty="0" smtClean="0"/>
-              <a:t>Навързване на функции: операторът </a:t>
-            </a:r>
-            <a:r>
-              <a:rPr lang="en-US" dirty="0" smtClean="0">
-                <a:solidFill>
-                  <a:schemeClr val="accent5">
-                    <a:lumMod val="75000"/>
-                  </a:schemeClr>
-                </a:solidFill>
-              </a:rPr>
-              <a:t>|</a:t>
-            </a:r>
-            <a:r>
-              <a:rPr lang="bg-BG" dirty="0" smtClean="0">
-                <a:solidFill>
-                  <a:schemeClr val="accent5">
-                    <a:lumMod val="75000"/>
-                  </a:schemeClr>
-                </a:solidFill>
-              </a:rPr>
-              <a:t>&gt;</a:t>
-            </a:r>
-            <a:endParaRPr lang="en-US" dirty="0" smtClean="0">
-              <a:solidFill>
-                <a:schemeClr val="accent5">
-                  <a:lumMod val="75000"/>
-                </a:schemeClr>
-              </a:solidFill>
-            </a:endParaRPr>
-          </a:p>
-          <a:p>
-            <a:r>
-              <a:rPr lang="bg-BG" dirty="0" smtClean="0"/>
-              <a:t>Рекурсия</a:t>
-            </a:r>
-          </a:p>
-          <a:p>
-            <a:pPr lvl="1"/>
-            <a:r>
-              <a:rPr lang="bg-BG" dirty="0" smtClean="0"/>
-              <a:t>“Опашата” рекурсия</a:t>
-            </a:r>
-            <a:endParaRPr lang="en-US" dirty="0"/>
+              <a:t>Колекции</a:t>
+            </a:r>
           </a:p>
         </p:txBody>
       </p:sp>
@@ -8256,7 +8527,7 @@
             <a:fld id="{4DBE1F54-EC49-4292-B678-A17F961BB737}" type="datetime4">
               <a:rPr lang="bg-BG" smtClean="0"/>
               <a:pPr/>
-              <a:t>16 април 2009 г.</a:t>
+              <a:t>17 април 2009 г.</a:t>
             </a:fld>
             <a:endParaRPr lang="en-US"/>
           </a:p>
@@ -8303,7 +8574,7 @@
           <a:p>
             <a:r>
               <a:rPr lang="bg-BG" dirty="0" smtClean="0"/>
-              <a:t>Демо 2 – магия с функции</a:t>
+              <a:t>Демо 1 – Основи</a:t>
             </a:r>
             <a:endParaRPr lang="en-US" dirty="0"/>
           </a:p>
@@ -8314,6 +8585,13 @@
   <p:clrMapOvr>
     <a:masterClrMapping/>
   </p:clrMapOvr>
+  <p:timing>
+    <p:tnLst>
+      <p:par>
+        <p:cTn id="1" dur="indefinite" restart="never" nodeType="tmRoot"/>
+      </p:par>
+    </p:tnLst>
+  </p:timing>
 </p:sld>
 </file>
 

</xml_diff>

<commit_message>
added github repo url for slide download
</commit_message>
<xml_diff>
--- a/MSDays09_HristoDeshev.pptx
+++ b/MSDays09_HristoDeshev.pptx
@@ -6343,7 +6343,33 @@
             <a:endParaRPr lang="bg-BG" sz="2400" dirty="0" smtClean="0"/>
           </a:p>
           <a:p>
-            <a:endParaRPr lang="en-US" dirty="0"/>
+            <a:r>
+              <a:rPr lang="bg-BG" dirty="0" smtClean="0"/>
+              <a:t>Днешните слайдове и код:</a:t>
+            </a:r>
+            <a:r>
+              <a:rPr lang="bg-BG" dirty="0" smtClean="0"/>
+              <a:t/>
+            </a:r>
+            <a:br>
+              <a:rPr lang="bg-BG" dirty="0" smtClean="0"/>
+            </a:br>
+            <a:r>
+              <a:rPr lang="en-US" dirty="0" smtClean="0">
+                <a:hlinkClick r:id="rId3"/>
+              </a:rPr>
+              <a:t>http://github.com/hdeshev/fsharp-msdays09</a:t>
+            </a:r>
+            <a:r>
+              <a:rPr lang="en-US" dirty="0" smtClean="0">
+                <a:hlinkClick r:id="rId3"/>
+              </a:rPr>
+              <a:t>/</a:t>
+            </a:r>
+            <a:r>
+              <a:rPr lang="bg-BG" smtClean="0"/>
+              <a:t> </a:t>
+            </a:r>
           </a:p>
         </p:txBody>
       </p:sp>
@@ -7618,11 +7644,7 @@
             <a:pPr lvl="2"/>
             <a:r>
               <a:rPr lang="bg-BG" dirty="0" smtClean="0"/>
-              <a:t>вместо как точно да </a:t>
-            </a:r>
-            <a:r>
-              <a:rPr lang="bg-BG" dirty="0" smtClean="0"/>
-              <a:t>стане</a:t>
+              <a:t>вместо как точно да стане</a:t>
             </a:r>
             <a:endParaRPr lang="bg-BG" sz="2400" b="0" dirty="0" smtClean="0">
               <a:solidFill>
@@ -7660,19 +7682,7 @@
                 </a:solidFill>
                 <a:latin typeface="Consolas" pitchFamily="49" charset="0"/>
               </a:rPr>
-              <a:t> </a:t>
-            </a:r>
-            <a:r>
-              <a:rPr lang="en-US" sz="2400" b="0" dirty="0" smtClean="0">
-                <a:solidFill>
-                  <a:schemeClr val="tx2">
-                    <a:lumMod val="60000"/>
-                    <a:lumOff val="40000"/>
-                  </a:schemeClr>
-                </a:solidFill>
-                <a:latin typeface="Consolas" pitchFamily="49" charset="0"/>
-              </a:rPr>
-              <a:t>from = new List&lt;</a:t>
+              <a:t> from = new List&lt;</a:t>
             </a:r>
             <a:r>
               <a:rPr lang="en-US" sz="2400" b="0" dirty="0" err="1" smtClean="0">
@@ -7696,19 +7706,7 @@
                 </a:solidFill>
                 <a:latin typeface="Consolas" pitchFamily="49" charset="0"/>
               </a:rPr>
-              <a:t>&gt;() { 1, 2, 3 </a:t>
-            </a:r>
-            <a:r>
-              <a:rPr lang="en-US" sz="2400" b="0" dirty="0" smtClean="0">
-                <a:solidFill>
-                  <a:schemeClr val="tx2">
-                    <a:lumMod val="60000"/>
-                    <a:lumOff val="40000"/>
-                  </a:schemeClr>
-                </a:solidFill>
-                <a:latin typeface="Consolas" pitchFamily="49" charset="0"/>
-              </a:rPr>
-              <a:t>};</a:t>
+              <a:t>&gt;() { 1, 2, 3 };</a:t>
             </a:r>
             <a:endParaRPr lang="bg-BG" sz="2400" b="0" dirty="0" smtClean="0">
               <a:solidFill>
@@ -7746,19 +7744,7 @@
                 </a:solidFill>
                 <a:latin typeface="Consolas" pitchFamily="49" charset="0"/>
               </a:rPr>
-              <a:t> </a:t>
-            </a:r>
-            <a:r>
-              <a:rPr lang="en-US" sz="2400" b="0" dirty="0" smtClean="0">
-                <a:solidFill>
-                  <a:schemeClr val="tx2">
-                    <a:lumMod val="60000"/>
-                    <a:lumOff val="40000"/>
-                  </a:schemeClr>
-                </a:solidFill>
-                <a:latin typeface="Consolas" pitchFamily="49" charset="0"/>
-              </a:rPr>
-              <a:t>to = new List&lt;</a:t>
+              <a:t> to = new List&lt;</a:t>
             </a:r>
             <a:r>
               <a:rPr lang="en-US" sz="2400" b="0" dirty="0" err="1" smtClean="0">
@@ -7808,31 +7794,7 @@
                 </a:solidFill>
                 <a:latin typeface="Consolas" pitchFamily="49" charset="0"/>
               </a:rPr>
-              <a:t>for </a:t>
-            </a:r>
-            <a:r>
-              <a:rPr lang="nn-NO" sz="2400" b="0" dirty="0" smtClean="0">
-                <a:solidFill>
-                  <a:schemeClr val="tx2">
-                    <a:lumMod val="60000"/>
-                    <a:lumOff val="40000"/>
-                  </a:schemeClr>
-                </a:solidFill>
-                <a:latin typeface="Consolas" pitchFamily="49" charset="0"/>
-              </a:rPr>
-              <a:t>(int i = 0; i &lt; from.Count; i</a:t>
-            </a:r>
-            <a:r>
-              <a:rPr lang="nn-NO" sz="2400" b="0" dirty="0" smtClean="0">
-                <a:solidFill>
-                  <a:schemeClr val="tx2">
-                    <a:lumMod val="60000"/>
-                    <a:lumOff val="40000"/>
-                  </a:schemeClr>
-                </a:solidFill>
-                <a:latin typeface="Consolas" pitchFamily="49" charset="0"/>
-              </a:rPr>
-              <a:t>++)</a:t>
+              <a:t>for (int i = 0; i &lt; from.Count; i++)</a:t>
             </a:r>
             <a:endParaRPr lang="bg-BG" sz="2400" b="0" dirty="0" smtClean="0">
               <a:solidFill>
@@ -7932,19 +7894,7 @@
                 </a:solidFill>
                 <a:latin typeface="Consolas" pitchFamily="49" charset="0"/>
               </a:rPr>
-              <a:t>] * 2</a:t>
-            </a:r>
-            <a:r>
-              <a:rPr lang="en-US" sz="2400" b="0" dirty="0" smtClean="0">
-                <a:solidFill>
-                  <a:schemeClr val="tx2">
-                    <a:lumMod val="60000"/>
-                    <a:lumOff val="40000"/>
-                  </a:schemeClr>
-                </a:solidFill>
-                <a:latin typeface="Consolas" pitchFamily="49" charset="0"/>
-              </a:rPr>
-              <a:t>);</a:t>
+              <a:t>] * 2);</a:t>
             </a:r>
             <a:endParaRPr lang="bg-BG" sz="2400" b="0" dirty="0" smtClean="0">
               <a:solidFill>
@@ -8111,40 +8061,22 @@
             <a:pPr lvl="1"/>
             <a:r>
               <a:rPr lang="bg-BG" dirty="0" smtClean="0"/>
-              <a:t>еднакъв резултат при еднакви параметри</a:t>
-            </a:r>
+              <a:t>еднакъв резултат при еднакви параметри;</a:t>
+            </a:r>
+          </a:p>
+          <a:p>
+            <a:pPr lvl="1"/>
             <a:r>
               <a:rPr lang="bg-BG" dirty="0" smtClean="0"/>
-              <a:t>;</a:t>
+              <a:t>трябва да можем да заменим функцията с таблица от параметър -&gt; резултат</a:t>
             </a:r>
           </a:p>
           <a:p>
             <a:pPr lvl="1"/>
             <a:r>
               <a:rPr lang="bg-BG" dirty="0" smtClean="0"/>
-              <a:t>трябва да можем </a:t>
-            </a:r>
-            <a:r>
-              <a:rPr lang="bg-BG" dirty="0" smtClean="0"/>
-              <a:t>да заменим функцията с таблица от параметър -&gt; </a:t>
-            </a:r>
-            <a:r>
-              <a:rPr lang="bg-BG" dirty="0" smtClean="0"/>
-              <a:t>резултат</a:t>
-            </a:r>
-            <a:endParaRPr lang="bg-BG" dirty="0" smtClean="0"/>
-          </a:p>
-          <a:p>
-            <a:pPr lvl="1"/>
-            <a:r>
-              <a:rPr lang="bg-BG" dirty="0" smtClean="0"/>
-              <a:t>без споделена “памет</a:t>
-            </a:r>
-            <a:r>
-              <a:rPr lang="bg-BG" dirty="0" smtClean="0"/>
-              <a:t>” и действия върху околния свят.</a:t>
-            </a:r>
-            <a:endParaRPr lang="bg-BG" dirty="0" smtClean="0"/>
+              <a:t>без споделена “памет” и действия върху околния свят.</a:t>
+            </a:r>
           </a:p>
         </p:txBody>
       </p:sp>

</xml_diff>

<commit_message>
last changes to the slides
</commit_message>
<xml_diff>
--- a/MSDays09_HristoDeshev.pptx
+++ b/MSDays09_HristoDeshev.pptx
@@ -6347,10 +6347,6 @@
               <a:rPr lang="bg-BG" dirty="0" smtClean="0"/>
               <a:t>Днешните слайдове и код:</a:t>
             </a:r>
-            <a:r>
-              <a:rPr lang="bg-BG" dirty="0" smtClean="0"/>
-              <a:t/>
-            </a:r>
             <a:br>
               <a:rPr lang="bg-BG" dirty="0" smtClean="0"/>
             </a:br>
@@ -6358,13 +6354,7 @@
               <a:rPr lang="en-US" dirty="0" smtClean="0">
                 <a:hlinkClick r:id="rId3"/>
               </a:rPr>
-              <a:t>http://github.com/hdeshev/fsharp-msdays09</a:t>
-            </a:r>
-            <a:r>
-              <a:rPr lang="en-US" dirty="0" smtClean="0">
-                <a:hlinkClick r:id="rId3"/>
-              </a:rPr>
-              <a:t>/</a:t>
+              <a:t>http://github.com/hdeshev/fsharp-msdays09/</a:t>
             </a:r>
             <a:r>
               <a:rPr lang="bg-BG" smtClean="0"/>
@@ -7661,7 +7651,21 @@
               <a:buNone/>
             </a:pPr>
             <a:r>
-              <a:rPr lang="en-US" sz="2400" b="0" dirty="0" err="1" smtClean="0">
+              <a:rPr lang="en-US" sz="1800" u="sng" dirty="0" smtClean="0">
+                <a:latin typeface="+mj-lt"/>
+              </a:rPr>
+              <a:t>C#</a:t>
+            </a:r>
+            <a:endParaRPr lang="en-US" sz="1800" u="sng" dirty="0" smtClean="0">
+              <a:latin typeface="+mj-lt"/>
+            </a:endParaRPr>
+          </a:p>
+          <a:p>
+            <a:pPr>
+              <a:buNone/>
+            </a:pPr>
+            <a:r>
+              <a:rPr lang="en-US" sz="1600" b="0" dirty="0" err="1" smtClean="0">
                 <a:solidFill>
                   <a:schemeClr val="tx2">
                     <a:lumMod val="60000"/>
@@ -7673,7 +7677,7 @@
               <a:t>var</a:t>
             </a:r>
             <a:r>
-              <a:rPr lang="en-US" sz="2400" b="0" dirty="0" smtClean="0">
+              <a:rPr lang="en-US" sz="1600" b="0" dirty="0" smtClean="0">
                 <a:solidFill>
                   <a:schemeClr val="tx2">
                     <a:lumMod val="60000"/>
@@ -7682,10 +7686,22 @@
                 </a:solidFill>
                 <a:latin typeface="Consolas" pitchFamily="49" charset="0"/>
               </a:rPr>
-              <a:t> from = new List&lt;</a:t>
-            </a:r>
-            <a:r>
-              <a:rPr lang="en-US" sz="2400" b="0" dirty="0" err="1" smtClean="0">
+              <a:t> </a:t>
+            </a:r>
+            <a:r>
+              <a:rPr lang="en-US" sz="1600" b="0" dirty="0" smtClean="0">
+                <a:solidFill>
+                  <a:schemeClr val="tx2">
+                    <a:lumMod val="60000"/>
+                    <a:lumOff val="40000"/>
+                  </a:schemeClr>
+                </a:solidFill>
+                <a:latin typeface="Consolas" pitchFamily="49" charset="0"/>
+              </a:rPr>
+              <a:t>from = new List&lt;</a:t>
+            </a:r>
+            <a:r>
+              <a:rPr lang="en-US" sz="1600" b="0" dirty="0" err="1" smtClean="0">
                 <a:solidFill>
                   <a:schemeClr val="tx2">
                     <a:lumMod val="60000"/>
@@ -7697,7 +7713,7 @@
               <a:t>int</a:t>
             </a:r>
             <a:r>
-              <a:rPr lang="en-US" sz="2400" b="0" dirty="0" smtClean="0">
+              <a:rPr lang="en-US" sz="1600" b="0" dirty="0" smtClean="0">
                 <a:solidFill>
                   <a:schemeClr val="tx2">
                     <a:lumMod val="60000"/>
@@ -7708,7 +7724,7 @@
               </a:rPr>
               <a:t>&gt;() { 1, 2, 3 };</a:t>
             </a:r>
-            <a:endParaRPr lang="bg-BG" sz="2400" b="0" dirty="0" smtClean="0">
+            <a:endParaRPr lang="bg-BG" sz="1600" b="0" dirty="0" smtClean="0">
               <a:solidFill>
                 <a:schemeClr val="tx2">
                   <a:lumMod val="60000"/>
@@ -7723,7 +7739,7 @@
               <a:buNone/>
             </a:pPr>
             <a:r>
-              <a:rPr lang="en-US" sz="2400" b="0" dirty="0" err="1" smtClean="0">
+              <a:rPr lang="en-US" sz="1600" b="0" dirty="0" err="1" smtClean="0">
                 <a:solidFill>
                   <a:schemeClr val="tx2">
                     <a:lumMod val="60000"/>
@@ -7735,7 +7751,7 @@
               <a:t>var</a:t>
             </a:r>
             <a:r>
-              <a:rPr lang="en-US" sz="2400" b="0" dirty="0" smtClean="0">
+              <a:rPr lang="en-US" sz="1600" b="0" dirty="0" smtClean="0">
                 <a:solidFill>
                   <a:schemeClr val="tx2">
                     <a:lumMod val="60000"/>
@@ -7747,7 +7763,7 @@
               <a:t> to = new List&lt;</a:t>
             </a:r>
             <a:r>
-              <a:rPr lang="en-US" sz="2400" b="0" dirty="0" err="1" smtClean="0">
+              <a:rPr lang="en-US" sz="1600" b="0" dirty="0" err="1" smtClean="0">
                 <a:solidFill>
                   <a:schemeClr val="tx2">
                     <a:lumMod val="60000"/>
@@ -7759,7 +7775,7 @@
               <a:t>int</a:t>
             </a:r>
             <a:r>
-              <a:rPr lang="en-US" sz="2400" b="0" dirty="0" smtClean="0">
+              <a:rPr lang="en-US" sz="1600" b="0" dirty="0" smtClean="0">
                 <a:solidFill>
                   <a:schemeClr val="tx2">
                     <a:lumMod val="60000"/>
@@ -7770,7 +7786,7 @@
               </a:rPr>
               <a:t>&gt;();</a:t>
             </a:r>
-            <a:endParaRPr lang="bg-BG" sz="2400" b="0" dirty="0" smtClean="0">
+            <a:endParaRPr lang="bg-BG" sz="1600" b="0" dirty="0" smtClean="0">
               <a:solidFill>
                 <a:schemeClr val="tx2">
                   <a:lumMod val="60000"/>
@@ -7785,7 +7801,7 @@
               <a:buNone/>
             </a:pPr>
             <a:r>
-              <a:rPr lang="nn-NO" sz="2400" b="0" dirty="0" smtClean="0">
+              <a:rPr lang="nn-NO" sz="1600" b="0" dirty="0" smtClean="0">
                 <a:solidFill>
                   <a:schemeClr val="tx2">
                     <a:lumMod val="60000"/>
@@ -7796,7 +7812,7 @@
               </a:rPr>
               <a:t>for (int i = 0; i &lt; from.Count; i++)</a:t>
             </a:r>
-            <a:endParaRPr lang="bg-BG" sz="2400" b="0" dirty="0" smtClean="0">
+            <a:endParaRPr lang="bg-BG" sz="1600" b="0" dirty="0" smtClean="0">
               <a:solidFill>
                 <a:schemeClr val="tx2">
                   <a:lumMod val="60000"/>
@@ -7811,7 +7827,7 @@
               <a:buNone/>
             </a:pPr>
             <a:r>
-              <a:rPr lang="en-US" sz="2400" b="0" dirty="0" smtClean="0">
+              <a:rPr lang="en-US" sz="1600" b="0" dirty="0" smtClean="0">
                 <a:solidFill>
                   <a:schemeClr val="tx2">
                     <a:lumMod val="60000"/>
@@ -7822,7 +7838,7 @@
               </a:rPr>
               <a:t>{</a:t>
             </a:r>
-            <a:endParaRPr lang="bg-BG" sz="2400" b="0" dirty="0" smtClean="0">
+            <a:endParaRPr lang="bg-BG" sz="1600" b="0" dirty="0" smtClean="0">
               <a:solidFill>
                 <a:schemeClr val="tx2">
                   <a:lumMod val="60000"/>
@@ -7837,7 +7853,7 @@
               <a:buNone/>
             </a:pPr>
             <a:r>
-              <a:rPr lang="en-US" sz="2400" b="0" dirty="0" smtClean="0">
+              <a:rPr lang="en-US" sz="1600" b="0" dirty="0" smtClean="0">
                 <a:solidFill>
                   <a:schemeClr val="tx2">
                     <a:lumMod val="60000"/>
@@ -7849,7 +7865,7 @@
               <a:t>    </a:t>
             </a:r>
             <a:r>
-              <a:rPr lang="en-US" sz="2400" b="0" dirty="0" err="1" smtClean="0">
+              <a:rPr lang="en-US" sz="1600" b="0" dirty="0" err="1" smtClean="0">
                 <a:solidFill>
                   <a:schemeClr val="tx2">
                     <a:lumMod val="60000"/>
@@ -7861,7 +7877,7 @@
               <a:t>to.Add</a:t>
             </a:r>
             <a:r>
-              <a:rPr lang="en-US" sz="2400" b="0" dirty="0" smtClean="0">
+              <a:rPr lang="en-US" sz="1600" b="0" dirty="0" smtClean="0">
                 <a:solidFill>
                   <a:schemeClr val="tx2">
                     <a:lumMod val="60000"/>
@@ -7873,7 +7889,7 @@
               <a:t>(from[</a:t>
             </a:r>
             <a:r>
-              <a:rPr lang="en-US" sz="2400" b="0" dirty="0" err="1" smtClean="0">
+              <a:rPr lang="en-US" sz="1600" b="0" dirty="0" err="1" smtClean="0">
                 <a:solidFill>
                   <a:schemeClr val="tx2">
                     <a:lumMod val="60000"/>
@@ -7885,7 +7901,7 @@
               <a:t>i</a:t>
             </a:r>
             <a:r>
-              <a:rPr lang="en-US" sz="2400" b="0" dirty="0" smtClean="0">
+              <a:rPr lang="en-US" sz="1600" b="0" dirty="0" smtClean="0">
                 <a:solidFill>
                   <a:schemeClr val="tx2">
                     <a:lumMod val="60000"/>
@@ -7896,7 +7912,7 @@
               </a:rPr>
               <a:t>] * 2);</a:t>
             </a:r>
-            <a:endParaRPr lang="bg-BG" sz="2400" b="0" dirty="0" smtClean="0">
+            <a:endParaRPr lang="bg-BG" sz="1600" b="0" dirty="0" smtClean="0">
               <a:solidFill>
                 <a:schemeClr val="tx2">
                   <a:lumMod val="60000"/>
@@ -7911,7 +7927,7 @@
               <a:buNone/>
             </a:pPr>
             <a:r>
-              <a:rPr lang="en-US" sz="2400" b="0" dirty="0" smtClean="0">
+              <a:rPr lang="en-US" sz="1600" b="0" dirty="0" smtClean="0">
                 <a:solidFill>
                   <a:schemeClr val="tx2">
                     <a:lumMod val="60000"/>
@@ -7922,7 +7938,38 @@
               </a:rPr>
               <a:t>}</a:t>
             </a:r>
-            <a:endParaRPr lang="en-US" sz="2400" b="0" dirty="0">
+          </a:p>
+          <a:p>
+            <a:pPr>
+              <a:buNone/>
+            </a:pPr>
+            <a:r>
+              <a:rPr lang="en-US" sz="1800" dirty="0" smtClean="0">
+                <a:latin typeface="+mj-lt"/>
+              </a:rPr>
+              <a:t>F#</a:t>
+            </a:r>
+            <a:endParaRPr lang="en-US" sz="1800" dirty="0" smtClean="0">
+              <a:latin typeface="+mj-lt"/>
+            </a:endParaRPr>
+          </a:p>
+          <a:p>
+            <a:pPr>
+              <a:buNone/>
+            </a:pPr>
+            <a:r>
+              <a:rPr lang="en-US" sz="1600" b="0" dirty="0" smtClean="0">
+                <a:solidFill>
+                  <a:schemeClr val="tx2">
+                    <a:lumMod val="60000"/>
+                    <a:lumOff val="40000"/>
+                  </a:schemeClr>
+                </a:solidFill>
+                <a:latin typeface="Consolas" pitchFamily="49" charset="0"/>
+              </a:rPr>
+              <a:t>let doubles = List.map (fun x -&gt; x * 2 ) [1; 2; 3]</a:t>
+            </a:r>
+            <a:endParaRPr lang="en-US" sz="1600" b="0" dirty="0">
               <a:solidFill>
                 <a:schemeClr val="tx2">
                   <a:lumMod val="60000"/>

</xml_diff>